<commit_message>
PPT avanzado con referencias y usos en Chile y el mundo
</commit_message>
<xml_diff>
--- a/SISTEMAS CONSTRUCTIVOS EN ALBAÑILERIÁ.pptx
+++ b/SISTEMAS CONSTRUCTIVOS EN ALBAÑILERIÁ.pptx
@@ -9,14 +9,21 @@
     <p:sldId id="257" r:id="rId3"/>
     <p:sldId id="259" r:id="rId4"/>
     <p:sldId id="260" r:id="rId5"/>
-    <p:sldId id="261" r:id="rId6"/>
+    <p:sldId id="269" r:id="rId6"/>
     <p:sldId id="262" r:id="rId7"/>
-    <p:sldId id="263" r:id="rId8"/>
-    <p:sldId id="264" r:id="rId9"/>
-    <p:sldId id="265" r:id="rId10"/>
-    <p:sldId id="266" r:id="rId11"/>
-    <p:sldId id="267" r:id="rId12"/>
-    <p:sldId id="268" r:id="rId13"/>
+    <p:sldId id="265" r:id="rId8"/>
+    <p:sldId id="270" r:id="rId9"/>
+    <p:sldId id="271" r:id="rId10"/>
+    <p:sldId id="272" r:id="rId11"/>
+    <p:sldId id="273" r:id="rId12"/>
+    <p:sldId id="274" r:id="rId13"/>
+    <p:sldId id="264" r:id="rId14"/>
+    <p:sldId id="275" r:id="rId15"/>
+    <p:sldId id="276" r:id="rId16"/>
+    <p:sldId id="277" r:id="rId17"/>
+    <p:sldId id="278" r:id="rId18"/>
+    <p:sldId id="267" r:id="rId19"/>
+    <p:sldId id="268" r:id="rId20"/>
   </p:sldIdLst>
   <p:sldSz cx="12192000" cy="6858000"/>
   <p:notesSz cx="6858000" cy="9144000"/>
@@ -218,7 +225,7 @@
           <a:effectLst/>
           <a:extLst>
             <a:ext uri="{91240B29-F687-4f45-9708-019B960494DF}">
-              <a14:hiddenLine xmlns="" xmlns:a14="http://schemas.microsoft.com/office/drawing/2010/main" w="9525">
+              <a14:hiddenLine xmlns:a14="http://schemas.microsoft.com/office/drawing/2010/main" xmlns="" w="9525">
                 <a:solidFill>
                   <a:srgbClr val="000000"/>
                 </a:solidFill>
@@ -452,7 +459,7 @@
           <a:p>
             <a:fld id="{D88726A3-D641-4DC4-B7D4-6194E61536F8}" type="slidenum">
               <a:rPr lang="es-CL" smtClean="0"/>
-              <a:t>‹Nº›</a:t>
+              <a:t>‹#›</a:t>
             </a:fld>
             <a:endParaRPr lang="es-CL"/>
           </a:p>
@@ -770,7 +777,7 @@
           <a:p>
             <a:fld id="{D88726A3-D641-4DC4-B7D4-6194E61536F8}" type="slidenum">
               <a:rPr lang="es-CL" smtClean="0"/>
-              <a:t>‹Nº›</a:t>
+              <a:t>‹#›</a:t>
             </a:fld>
             <a:endParaRPr lang="es-CL"/>
           </a:p>
@@ -1258,7 +1265,7 @@
           <a:p>
             <a:fld id="{D88726A3-D641-4DC4-B7D4-6194E61536F8}" type="slidenum">
               <a:rPr lang="es-CL" smtClean="0"/>
-              <a:t>‹Nº›</a:t>
+              <a:t>‹#›</a:t>
             </a:fld>
             <a:endParaRPr lang="es-CL"/>
           </a:p>
@@ -1627,7 +1634,7 @@
           <a:p>
             <a:fld id="{D88726A3-D641-4DC4-B7D4-6194E61536F8}" type="slidenum">
               <a:rPr lang="es-CL" smtClean="0"/>
-              <a:t>‹Nº›</a:t>
+              <a:t>‹#›</a:t>
             </a:fld>
             <a:endParaRPr lang="es-CL"/>
           </a:p>
@@ -1740,7 +1747,7 @@
           <a:ln/>
           <a:extLst>
             <a:ext uri="{91240B29-F687-4f45-9708-019B960494DF}">
-              <a14:hiddenLine xmlns="" xmlns:a14="http://schemas.microsoft.com/office/drawing/2010/main" w="9525">
+              <a14:hiddenLine xmlns:a14="http://schemas.microsoft.com/office/drawing/2010/main" xmlns="" w="9525">
                 <a:solidFill>
                   <a:srgbClr val="000000"/>
                 </a:solidFill>
@@ -1900,7 +1907,7 @@
           <a:p>
             <a:fld id="{D88726A3-D641-4DC4-B7D4-6194E61536F8}" type="slidenum">
               <a:rPr lang="es-CL" smtClean="0"/>
-              <a:t>‹Nº›</a:t>
+              <a:t>‹#›</a:t>
             </a:fld>
             <a:endParaRPr lang="es-CL"/>
           </a:p>
@@ -2015,7 +2022,7 @@
           <a:ln/>
           <a:extLst>
             <a:ext uri="{91240B29-F687-4f45-9708-019B960494DF}">
-              <a14:hiddenLine xmlns="" xmlns:a14="http://schemas.microsoft.com/office/drawing/2010/main" w="9525">
+              <a14:hiddenLine xmlns:a14="http://schemas.microsoft.com/office/drawing/2010/main" xmlns="" w="9525">
                 <a:solidFill>
                   <a:srgbClr val="000000"/>
                 </a:solidFill>
@@ -2185,7 +2192,7 @@
           <a:p>
             <a:fld id="{D88726A3-D641-4DC4-B7D4-6194E61536F8}" type="slidenum">
               <a:rPr lang="es-CL" smtClean="0"/>
-              <a:t>‹Nº›</a:t>
+              <a:t>‹#›</a:t>
             </a:fld>
             <a:endParaRPr lang="es-CL"/>
           </a:p>
@@ -2298,7 +2305,7 @@
           <a:ln/>
           <a:extLst>
             <a:ext uri="{91240B29-F687-4f45-9708-019B960494DF}">
-              <a14:hiddenLine xmlns="" xmlns:a14="http://schemas.microsoft.com/office/drawing/2010/main" w="9525">
+              <a14:hiddenLine xmlns:a14="http://schemas.microsoft.com/office/drawing/2010/main" xmlns="" w="9525">
                 <a:solidFill>
                   <a:srgbClr val="000000"/>
                 </a:solidFill>
@@ -2468,7 +2475,7 @@
           <a:p>
             <a:fld id="{D88726A3-D641-4DC4-B7D4-6194E61536F8}" type="slidenum">
               <a:rPr lang="es-CL" smtClean="0"/>
-              <a:t>‹Nº›</a:t>
+              <a:t>‹#›</a:t>
             </a:fld>
             <a:endParaRPr lang="es-CL"/>
           </a:p>
@@ -2811,7 +2818,7 @@
           <a:p>
             <a:fld id="{D88726A3-D641-4DC4-B7D4-6194E61536F8}" type="slidenum">
               <a:rPr lang="es-CL" smtClean="0"/>
-              <a:t>‹Nº›</a:t>
+              <a:t>‹#›</a:t>
             </a:fld>
             <a:endParaRPr lang="es-CL"/>
           </a:p>
@@ -2924,7 +2931,7 @@
           <a:ln/>
           <a:extLst>
             <a:ext uri="{91240B29-F687-4f45-9708-019B960494DF}">
-              <a14:hiddenLine xmlns="" xmlns:a14="http://schemas.microsoft.com/office/drawing/2010/main" w="9525">
+              <a14:hiddenLine xmlns:a14="http://schemas.microsoft.com/office/drawing/2010/main" xmlns="" w="9525">
                 <a:solidFill>
                   <a:srgbClr val="000000"/>
                 </a:solidFill>
@@ -3150,7 +3157,7 @@
           <a:p>
             <a:fld id="{D88726A3-D641-4DC4-B7D4-6194E61536F8}" type="slidenum">
               <a:rPr lang="es-CL" smtClean="0"/>
-              <a:t>‹Nº›</a:t>
+              <a:t>‹#›</a:t>
             </a:fld>
             <a:endParaRPr lang="es-CL"/>
           </a:p>
@@ -3263,7 +3270,7 @@
           <a:ln/>
           <a:extLst>
             <a:ext uri="{91240B29-F687-4f45-9708-019B960494DF}">
-              <a14:hiddenLine xmlns="" xmlns:a14="http://schemas.microsoft.com/office/drawing/2010/main" w="9525">
+              <a14:hiddenLine xmlns:a14="http://schemas.microsoft.com/office/drawing/2010/main" xmlns="" w="9525">
                 <a:solidFill>
                   <a:srgbClr val="000000"/>
                 </a:solidFill>
@@ -3627,7 +3634,7 @@
           <a:p>
             <a:fld id="{D88726A3-D641-4DC4-B7D4-6194E61536F8}" type="slidenum">
               <a:rPr lang="es-CL" smtClean="0"/>
-              <a:t>‹Nº›</a:t>
+              <a:t>‹#›</a:t>
             </a:fld>
             <a:endParaRPr lang="es-CL"/>
           </a:p>
@@ -3740,7 +3747,7 @@
           <a:ln/>
           <a:extLst>
             <a:ext uri="{91240B29-F687-4f45-9708-019B960494DF}">
-              <a14:hiddenLine xmlns="" xmlns:a14="http://schemas.microsoft.com/office/drawing/2010/main" w="9525">
+              <a14:hiddenLine xmlns:a14="http://schemas.microsoft.com/office/drawing/2010/main" xmlns="" w="9525">
                 <a:solidFill>
                   <a:srgbClr val="000000"/>
                 </a:solidFill>
@@ -3848,7 +3855,7 @@
           <a:p>
             <a:fld id="{D88726A3-D641-4DC4-B7D4-6194E61536F8}" type="slidenum">
               <a:rPr lang="es-CL" smtClean="0"/>
-              <a:t>‹Nº›</a:t>
+              <a:t>‹#›</a:t>
             </a:fld>
             <a:endParaRPr lang="es-CL"/>
           </a:p>
@@ -3943,7 +3950,7 @@
           <a:p>
             <a:fld id="{D88726A3-D641-4DC4-B7D4-6194E61536F8}" type="slidenum">
               <a:rPr lang="es-CL" smtClean="0"/>
-              <a:t>‹Nº›</a:t>
+              <a:t>‹#›</a:t>
             </a:fld>
             <a:endParaRPr lang="es-CL"/>
           </a:p>
@@ -4169,7 +4176,7 @@
           <a:ln/>
           <a:extLst>
             <a:ext uri="{91240B29-F687-4f45-9708-019B960494DF}">
-              <a14:hiddenLine xmlns="" xmlns:a14="http://schemas.microsoft.com/office/drawing/2010/main" w="9525">
+              <a14:hiddenLine xmlns:a14="http://schemas.microsoft.com/office/drawing/2010/main" xmlns="" w="9525">
                 <a:solidFill>
                   <a:srgbClr val="000000"/>
                 </a:solidFill>
@@ -4410,7 +4417,7 @@
           <a:p>
             <a:fld id="{D88726A3-D641-4DC4-B7D4-6194E61536F8}" type="slidenum">
               <a:rPr lang="es-CL" smtClean="0"/>
-              <a:t>‹Nº›</a:t>
+              <a:t>‹#›</a:t>
             </a:fld>
             <a:endParaRPr lang="es-CL"/>
           </a:p>
@@ -4733,7 +4740,7 @@
           <a:p>
             <a:fld id="{D88726A3-D641-4DC4-B7D4-6194E61536F8}" type="slidenum">
               <a:rPr lang="es-CL" smtClean="0"/>
-              <a:t>‹Nº›</a:t>
+              <a:t>‹#›</a:t>
             </a:fld>
             <a:endParaRPr lang="es-CL"/>
           </a:p>
@@ -4990,7 +4997,7 @@
           <a:p>
             <a:fld id="{D88726A3-D641-4DC4-B7D4-6194E61536F8}" type="slidenum">
               <a:rPr lang="es-CL" smtClean="0"/>
-              <a:t>‹Nº›</a:t>
+              <a:t>‹#›</a:t>
             </a:fld>
             <a:endParaRPr lang="es-CL"/>
           </a:p>
@@ -5469,7 +5476,7 @@
                   <a:srgbClr val="FFFFFF"/>
                 </a:solidFill>
               </a:rPr>
-              <a:t>SISTEMAS CONSTRUCTIVOS EN ALBAÑILERIÁ</a:t>
+              <a:t>SISTEMAS CONSTRUCTIVOS EN ALBAÑILERIA</a:t>
             </a:r>
           </a:p>
         </p:txBody>
@@ -5492,43 +5499,37 @@
         </p:nvSpPr>
         <p:spPr>
           <a:xfrm>
-            <a:off x="9304006" y="5145154"/>
-            <a:ext cx="7304152" cy="1117687"/>
+            <a:off x="7668950" y="5271050"/>
+            <a:ext cx="4523050" cy="1586950"/>
           </a:xfrm>
         </p:spPr>
         <p:txBody>
           <a:bodyPr>
-            <a:normAutofit fontScale="25000" lnSpcReduction="20000"/>
+            <a:normAutofit fontScale="32500" lnSpcReduction="20000"/>
           </a:bodyPr>
           <a:lstStyle/>
           <a:p>
             <a:r>
               <a:rPr lang="es-CL" sz="6000" dirty="0"/>
-              <a:t>Integrantes: Mauricio Leal V.</a:t>
+              <a:t>Integrantes: 	Mauricio Leal V.</a:t>
             </a:r>
           </a:p>
           <a:p>
             <a:r>
               <a:rPr lang="es-CL" sz="6000" dirty="0"/>
-              <a:t>Pablo Pizarro R.</a:t>
+              <a:t>				Pablo Pizarro R.</a:t>
             </a:r>
           </a:p>
           <a:p>
             <a:r>
               <a:rPr lang="es-CL" sz="6000" dirty="0"/>
-              <a:t>Ignacio Yáñez G.</a:t>
+              <a:t>				Ignacio Yáñez G.</a:t>
             </a:r>
           </a:p>
           <a:p>
             <a:r>
               <a:rPr lang="es-CL" sz="6000" dirty="0"/>
-              <a:t>Profesor: Jorge Pulgar A.</a:t>
-            </a:r>
-          </a:p>
-          <a:p>
-            <a:r>
-              <a:rPr lang="es-CL" sz="6000" dirty="0"/>
-              <a:t>Fecha:</a:t>
+              <a:t>Profesor: 		Jorge Pulgar A.</a:t>
             </a:r>
           </a:p>
           <a:p>
@@ -5571,10 +5572,10 @@
       </p:grpSpPr>
       <p:sp>
         <p:nvSpPr>
-          <p:cNvPr id="2" name="Título 1">
+          <p:cNvPr id="4" name="Title 1">
             <a:extLst>
               <a:ext uri="{FF2B5EF4-FFF2-40B4-BE49-F238E27FC236}">
-                <a16:creationId xmlns:a16="http://schemas.microsoft.com/office/drawing/2014/main" id="{30646B5B-FE3B-4563-9034-E6C868675BC6}"/>
+                <a16:creationId xmlns:a16="http://schemas.microsoft.com/office/drawing/2014/main" id="{B2945E88-F542-47CA-8EC5-B4AE0EA70314}"/>
               </a:ext>
             </a:extLst>
           </p:cNvPr>
@@ -5585,47 +5586,114 @@
             <p:ph type="title"/>
           </p:nvPr>
         </p:nvSpPr>
-        <p:spPr/>
+        <p:spPr>
+          <a:xfrm>
+            <a:off x="810000" y="447188"/>
+            <a:ext cx="10571998" cy="970450"/>
+          </a:xfrm>
+        </p:spPr>
         <p:txBody>
           <a:bodyPr/>
           <a:lstStyle/>
           <a:p>
             <a:r>
               <a:rPr lang="es-CL" dirty="0"/>
-              <a:t>LIMITACIONES</a:t>
-            </a:r>
-          </a:p>
-        </p:txBody>
-      </p:sp>
-      <p:sp>
-        <p:nvSpPr>
-          <p:cNvPr id="3" name="Marcador de contenido 2">
+              <a:t>USO EN CHILE</a:t>
+            </a:r>
+            <a:endParaRPr lang="es-MX" dirty="0"/>
+          </a:p>
+        </p:txBody>
+      </p:sp>
+      <p:pic>
+        <p:nvPicPr>
+          <p:cNvPr id="6" name="Content Placeholder 5">
             <a:extLst>
               <a:ext uri="{FF2B5EF4-FFF2-40B4-BE49-F238E27FC236}">
-                <a16:creationId xmlns:a16="http://schemas.microsoft.com/office/drawing/2014/main" id="{2A01C607-5E90-4419-A0C2-96BF0D6367CF}"/>
+                <a16:creationId xmlns:a16="http://schemas.microsoft.com/office/drawing/2014/main" id="{AB623279-9D42-4E97-BA93-FA698E4F3F4E}"/>
               </a:ext>
             </a:extLst>
           </p:cNvPr>
-          <p:cNvSpPr>
-            <a:spLocks noGrp="1"/>
-          </p:cNvSpPr>
+          <p:cNvPicPr>
+            <a:picLocks noGrp="1" noChangeAspect="1"/>
+          </p:cNvPicPr>
           <p:nvPr>
             <p:ph idx="1"/>
           </p:nvPr>
-        </p:nvSpPr>
-        <p:spPr/>
-        <p:txBody>
-          <a:bodyPr/>
-          <a:lstStyle/>
-          <a:p>
-            <a:endParaRPr lang="es-CL"/>
+        </p:nvPicPr>
+        <p:blipFill rotWithShape="1">
+          <a:blip r:embed="rId2">
+            <a:extLst>
+              <a:ext uri="{28A0092B-C50C-407E-A947-70E740481C1C}">
+                <a14:useLocalDpi xmlns:a14="http://schemas.microsoft.com/office/drawing/2010/main" val="0"/>
+              </a:ext>
+            </a:extLst>
+          </a:blip>
+          <a:srcRect t="19958"/>
+          <a:stretch/>
+        </p:blipFill>
+        <p:spPr>
+          <a:xfrm>
+            <a:off x="2495998" y="2349000"/>
+            <a:ext cx="7426878" cy="3960000"/>
+          </a:xfrm>
+          <a:prstGeom prst="rect">
+            <a:avLst/>
+          </a:prstGeom>
+        </p:spPr>
+      </p:pic>
+      <p:sp>
+        <p:nvSpPr>
+          <p:cNvPr id="11" name="TextBox 10">
+            <a:extLst>
+              <a:ext uri="{FF2B5EF4-FFF2-40B4-BE49-F238E27FC236}">
+                <a16:creationId xmlns:a16="http://schemas.microsoft.com/office/drawing/2014/main" id="{F0B110A5-529C-420E-967E-B6FA5F077918}"/>
+              </a:ext>
+            </a:extLst>
+          </p:cNvPr>
+          <p:cNvSpPr txBox="1"/>
+          <p:nvPr/>
+        </p:nvSpPr>
+        <p:spPr>
+          <a:xfrm>
+            <a:off x="4403869" y="6410812"/>
+            <a:ext cx="3384261" cy="307777"/>
+          </a:xfrm>
+          <a:prstGeom prst="rect">
+            <a:avLst/>
+          </a:prstGeom>
+          <a:noFill/>
+        </p:spPr>
+        <p:txBody>
+          <a:bodyPr wrap="none" rtlCol="0">
+            <a:spAutoFit/>
+          </a:bodyPr>
+          <a:lstStyle/>
+          <a:p>
+            <a:pPr algn="ctr"/>
+            <a:r>
+              <a:rPr lang="es-CL" sz="1400" dirty="0">
+                <a:solidFill>
+                  <a:schemeClr val="tx2">
+                    <a:lumMod val="50000"/>
+                  </a:schemeClr>
+                </a:solidFill>
+              </a:rPr>
+              <a:t>Edificio ex arsenales de guerra. 1985.</a:t>
+            </a:r>
+            <a:endParaRPr lang="es-MX" sz="1400" dirty="0">
+              <a:solidFill>
+                <a:schemeClr val="tx2">
+                  <a:lumMod val="50000"/>
+                </a:schemeClr>
+              </a:solidFill>
+            </a:endParaRPr>
           </a:p>
         </p:txBody>
       </p:sp>
     </p:spTree>
     <p:extLst>
       <p:ext uri="{BB962C8B-B14F-4D97-AF65-F5344CB8AC3E}">
-        <p14:creationId xmlns:p14="http://schemas.microsoft.com/office/powerpoint/2010/main" val="1665503870"/>
+        <p14:creationId xmlns:p14="http://schemas.microsoft.com/office/powerpoint/2010/main" val="1685380237"/>
       </p:ext>
     </p:extLst>
   </p:cSld>
@@ -5652,63 +5720,128 @@
           <a:chExt cx="0" cy="0"/>
         </a:xfrm>
       </p:grpSpPr>
-      <p:sp>
-        <p:nvSpPr>
-          <p:cNvPr id="2" name="Título 1">
+      <p:pic>
+        <p:nvPicPr>
+          <p:cNvPr id="4" name="Picture 3">
             <a:extLst>
               <a:ext uri="{FF2B5EF4-FFF2-40B4-BE49-F238E27FC236}">
-                <a16:creationId xmlns:a16="http://schemas.microsoft.com/office/drawing/2014/main" id="{269D34A6-CEA9-4551-A486-097F07B05AD9}"/>
+                <a16:creationId xmlns:a16="http://schemas.microsoft.com/office/drawing/2014/main" id="{77ABA89A-CE3A-43C0-9FE0-07324529052A}"/>
               </a:ext>
             </a:extLst>
           </p:cNvPr>
-          <p:cNvSpPr>
-            <a:spLocks noGrp="1"/>
-          </p:cNvSpPr>
-          <p:nvPr>
-            <p:ph type="title"/>
-          </p:nvPr>
-        </p:nvSpPr>
-        <p:spPr/>
-        <p:txBody>
-          <a:bodyPr/>
-          <a:lstStyle/>
-          <a:p>
-            <a:r>
-              <a:rPr lang="es-CL" dirty="0"/>
-              <a:t>CUBICACIONES</a:t>
-            </a:r>
-          </a:p>
-        </p:txBody>
-      </p:sp>
-      <p:sp>
-        <p:nvSpPr>
-          <p:cNvPr id="3" name="Marcador de contenido 2">
+          <p:cNvPicPr>
+            <a:picLocks noChangeAspect="1"/>
+          </p:cNvPicPr>
+          <p:nvPr/>
+        </p:nvPicPr>
+        <p:blipFill rotWithShape="1">
+          <a:blip r:embed="rId2">
+            <a:extLst>
+              <a:ext uri="{28A0092B-C50C-407E-A947-70E740481C1C}">
+                <a14:useLocalDpi xmlns:a14="http://schemas.microsoft.com/office/drawing/2010/main" val="0"/>
+              </a:ext>
+            </a:extLst>
+          </a:blip>
+          <a:srcRect t="3854" b="10881"/>
+          <a:stretch/>
+        </p:blipFill>
+        <p:spPr>
+          <a:xfrm>
+            <a:off x="2495998" y="2349000"/>
+            <a:ext cx="7379309" cy="3960000"/>
+          </a:xfrm>
+          <a:prstGeom prst="rect">
+            <a:avLst/>
+          </a:prstGeom>
+        </p:spPr>
+      </p:pic>
+      <p:sp>
+        <p:nvSpPr>
+          <p:cNvPr id="5" name="TextBox 4">
             <a:extLst>
               <a:ext uri="{FF2B5EF4-FFF2-40B4-BE49-F238E27FC236}">
-                <a16:creationId xmlns:a16="http://schemas.microsoft.com/office/drawing/2014/main" id="{0AFA8CF1-302B-4FA8-8928-4F60FD8E8582}"/>
+                <a16:creationId xmlns:a16="http://schemas.microsoft.com/office/drawing/2014/main" id="{CBA1368A-3808-40CE-B601-39BE633B4B23}"/>
               </a:ext>
             </a:extLst>
           </p:cNvPr>
-          <p:cNvSpPr>
-            <a:spLocks noGrp="1"/>
-          </p:cNvSpPr>
-          <p:nvPr>
-            <p:ph idx="1"/>
-          </p:nvPr>
-        </p:nvSpPr>
-        <p:spPr/>
+          <p:cNvSpPr txBox="1"/>
+          <p:nvPr/>
+        </p:nvSpPr>
+        <p:spPr>
+          <a:xfrm>
+            <a:off x="4131359" y="6410325"/>
+            <a:ext cx="3929281" cy="307777"/>
+          </a:xfrm>
+          <a:prstGeom prst="rect">
+            <a:avLst/>
+          </a:prstGeom>
+          <a:noFill/>
+        </p:spPr>
+        <p:txBody>
+          <a:bodyPr wrap="none" rtlCol="0">
+            <a:spAutoFit/>
+          </a:bodyPr>
+          <a:lstStyle/>
+          <a:p>
+            <a:pPr algn="ctr"/>
+            <a:r>
+              <a:rPr lang="es-CL" sz="1400" dirty="0">
+                <a:solidFill>
+                  <a:schemeClr val="tx2">
+                    <a:lumMod val="50000"/>
+                  </a:schemeClr>
+                </a:solidFill>
+              </a:rPr>
+              <a:t>Iglesia y Convento de San Francisco. 1618. </a:t>
+            </a:r>
+            <a:endParaRPr lang="es-MX" sz="1400" dirty="0">
+              <a:solidFill>
+                <a:schemeClr val="tx2">
+                  <a:lumMod val="50000"/>
+                </a:schemeClr>
+              </a:solidFill>
+            </a:endParaRPr>
+          </a:p>
+        </p:txBody>
+      </p:sp>
+      <p:sp>
+        <p:nvSpPr>
+          <p:cNvPr id="6" name="Title 1">
+            <a:extLst>
+              <a:ext uri="{FF2B5EF4-FFF2-40B4-BE49-F238E27FC236}">
+                <a16:creationId xmlns:a16="http://schemas.microsoft.com/office/drawing/2014/main" id="{84D9D71C-C2E3-4446-966A-B17F4DE05698}"/>
+              </a:ext>
+            </a:extLst>
+          </p:cNvPr>
+          <p:cNvSpPr>
+            <a:spLocks noGrp="1"/>
+          </p:cNvSpPr>
+          <p:nvPr>
+            <p:ph type="title"/>
+          </p:nvPr>
+        </p:nvSpPr>
+        <p:spPr>
+          <a:xfrm>
+            <a:off x="809625" y="447675"/>
+            <a:ext cx="10572750" cy="969963"/>
+          </a:xfrm>
+        </p:spPr>
         <p:txBody>
           <a:bodyPr/>
           <a:lstStyle/>
           <a:p>
-            <a:endParaRPr lang="es-CL"/>
+            <a:r>
+              <a:rPr lang="es-CL" dirty="0"/>
+              <a:t>USO EN CHILE</a:t>
+            </a:r>
+            <a:endParaRPr lang="es-MX" dirty="0"/>
           </a:p>
         </p:txBody>
       </p:sp>
     </p:spTree>
     <p:extLst>
       <p:ext uri="{BB962C8B-B14F-4D97-AF65-F5344CB8AC3E}">
-        <p14:creationId xmlns:p14="http://schemas.microsoft.com/office/powerpoint/2010/main" val="2217409196"/>
+        <p14:creationId xmlns:p14="http://schemas.microsoft.com/office/powerpoint/2010/main" val="3650914507"/>
       </p:ext>
     </p:extLst>
   </p:cSld>
@@ -5735,6 +5868,958 @@
           <a:chExt cx="0" cy="0"/>
         </a:xfrm>
       </p:grpSpPr>
+      <p:pic>
+        <p:nvPicPr>
+          <p:cNvPr id="4" name="Picture 3">
+            <a:extLst>
+              <a:ext uri="{FF2B5EF4-FFF2-40B4-BE49-F238E27FC236}">
+                <a16:creationId xmlns:a16="http://schemas.microsoft.com/office/drawing/2014/main" id="{E24A22A6-B7E4-49D6-AB0A-2F23A09E4965}"/>
+              </a:ext>
+            </a:extLst>
+          </p:cNvPr>
+          <p:cNvPicPr>
+            <a:picLocks noChangeAspect="1"/>
+          </p:cNvPicPr>
+          <p:nvPr/>
+        </p:nvPicPr>
+        <p:blipFill rotWithShape="1">
+          <a:blip r:embed="rId2">
+            <a:extLst>
+              <a:ext uri="{28A0092B-C50C-407E-A947-70E740481C1C}">
+                <a14:useLocalDpi xmlns:a14="http://schemas.microsoft.com/office/drawing/2010/main" val="0"/>
+              </a:ext>
+            </a:extLst>
+          </a:blip>
+          <a:srcRect t="3998" b="2859"/>
+          <a:stretch/>
+        </p:blipFill>
+        <p:spPr>
+          <a:xfrm>
+            <a:off x="2496000" y="2349000"/>
+            <a:ext cx="7555420" cy="3960000"/>
+          </a:xfrm>
+          <a:prstGeom prst="rect">
+            <a:avLst/>
+          </a:prstGeom>
+        </p:spPr>
+      </p:pic>
+      <p:sp>
+        <p:nvSpPr>
+          <p:cNvPr id="6" name="Title 1">
+            <a:extLst>
+              <a:ext uri="{FF2B5EF4-FFF2-40B4-BE49-F238E27FC236}">
+                <a16:creationId xmlns:a16="http://schemas.microsoft.com/office/drawing/2014/main" id="{31BB28F8-8614-4253-A96F-CB2EE9A9DE19}"/>
+              </a:ext>
+            </a:extLst>
+          </p:cNvPr>
+          <p:cNvSpPr>
+            <a:spLocks noGrp="1"/>
+          </p:cNvSpPr>
+          <p:nvPr>
+            <p:ph type="title"/>
+          </p:nvPr>
+        </p:nvSpPr>
+        <p:spPr>
+          <a:xfrm>
+            <a:off x="810000" y="447188"/>
+            <a:ext cx="10571998" cy="970450"/>
+          </a:xfrm>
+        </p:spPr>
+        <p:txBody>
+          <a:bodyPr/>
+          <a:lstStyle/>
+          <a:p>
+            <a:r>
+              <a:rPr lang="es-CL" dirty="0"/>
+              <a:t>USO EN CHILE</a:t>
+            </a:r>
+            <a:endParaRPr lang="es-MX" dirty="0"/>
+          </a:p>
+        </p:txBody>
+      </p:sp>
+      <p:sp>
+        <p:nvSpPr>
+          <p:cNvPr id="7" name="TextBox 6">
+            <a:extLst>
+              <a:ext uri="{FF2B5EF4-FFF2-40B4-BE49-F238E27FC236}">
+                <a16:creationId xmlns:a16="http://schemas.microsoft.com/office/drawing/2014/main" id="{2897AB38-AB48-4BEE-90C8-806C0A34F351}"/>
+              </a:ext>
+            </a:extLst>
+          </p:cNvPr>
+          <p:cNvSpPr txBox="1"/>
+          <p:nvPr/>
+        </p:nvSpPr>
+        <p:spPr>
+          <a:xfrm>
+            <a:off x="4778972" y="6410812"/>
+            <a:ext cx="2634054" cy="307777"/>
+          </a:xfrm>
+          <a:prstGeom prst="rect">
+            <a:avLst/>
+          </a:prstGeom>
+          <a:noFill/>
+        </p:spPr>
+        <p:txBody>
+          <a:bodyPr wrap="none" rtlCol="0">
+            <a:spAutoFit/>
+          </a:bodyPr>
+          <a:lstStyle/>
+          <a:p>
+            <a:pPr algn="ctr"/>
+            <a:r>
+              <a:rPr lang="es-CL" sz="1400" dirty="0">
+                <a:solidFill>
+                  <a:schemeClr val="tx2">
+                    <a:lumMod val="50000"/>
+                  </a:schemeClr>
+                </a:solidFill>
+              </a:rPr>
+              <a:t>Catedral de Santiago. 1745.</a:t>
+            </a:r>
+            <a:endParaRPr lang="es-MX" sz="1400" dirty="0">
+              <a:solidFill>
+                <a:schemeClr val="tx2">
+                  <a:lumMod val="50000"/>
+                </a:schemeClr>
+              </a:solidFill>
+            </a:endParaRPr>
+          </a:p>
+        </p:txBody>
+      </p:sp>
+    </p:spTree>
+    <p:extLst>
+      <p:ext uri="{BB962C8B-B14F-4D97-AF65-F5344CB8AC3E}">
+        <p14:creationId xmlns:p14="http://schemas.microsoft.com/office/powerpoint/2010/main" val="1609964782"/>
+      </p:ext>
+    </p:extLst>
+  </p:cSld>
+  <p:clrMapOvr>
+    <a:masterClrMapping/>
+  </p:clrMapOvr>
+</p:sld>
+</file>
+
+<file path=ppt/slides/slide13.xml><?xml version="1.0" encoding="utf-8"?>
+<p:sld xmlns:a="http://schemas.openxmlformats.org/drawingml/2006/main" xmlns:r="http://schemas.openxmlformats.org/officeDocument/2006/relationships" xmlns:p="http://schemas.openxmlformats.org/presentationml/2006/main">
+  <p:cSld>
+    <p:spTree>
+      <p:nvGrpSpPr>
+        <p:cNvPr id="1" name=""/>
+        <p:cNvGrpSpPr/>
+        <p:nvPr/>
+      </p:nvGrpSpPr>
+      <p:grpSpPr>
+        <a:xfrm>
+          <a:off x="0" y="0"/>
+          <a:ext cx="0" cy="0"/>
+          <a:chOff x="0" y="0"/>
+          <a:chExt cx="0" cy="0"/>
+        </a:xfrm>
+      </p:grpSpPr>
+      <p:sp>
+        <p:nvSpPr>
+          <p:cNvPr id="2" name="Título 1">
+            <a:extLst>
+              <a:ext uri="{FF2B5EF4-FFF2-40B4-BE49-F238E27FC236}">
+                <a16:creationId xmlns:a16="http://schemas.microsoft.com/office/drawing/2014/main" id="{7963A088-C063-40F0-8AD2-8AAC6199450A}"/>
+              </a:ext>
+            </a:extLst>
+          </p:cNvPr>
+          <p:cNvSpPr>
+            <a:spLocks noGrp="1"/>
+          </p:cNvSpPr>
+          <p:nvPr>
+            <p:ph type="title"/>
+          </p:nvPr>
+        </p:nvSpPr>
+        <p:spPr/>
+        <p:txBody>
+          <a:bodyPr/>
+          <a:lstStyle/>
+          <a:p>
+            <a:r>
+              <a:rPr lang="es-CL" dirty="0"/>
+              <a:t>USO EN EL MUNDO</a:t>
+            </a:r>
+          </a:p>
+        </p:txBody>
+      </p:sp>
+      <p:sp>
+        <p:nvSpPr>
+          <p:cNvPr id="3" name="Marcador de contenido 2">
+            <a:extLst>
+              <a:ext uri="{FF2B5EF4-FFF2-40B4-BE49-F238E27FC236}">
+                <a16:creationId xmlns:a16="http://schemas.microsoft.com/office/drawing/2014/main" id="{22ABBA1F-64A6-4E9A-90FE-8AC824113733}"/>
+              </a:ext>
+            </a:extLst>
+          </p:cNvPr>
+          <p:cNvSpPr>
+            <a:spLocks noGrp="1"/>
+          </p:cNvSpPr>
+          <p:nvPr>
+            <p:ph idx="1"/>
+          </p:nvPr>
+        </p:nvSpPr>
+        <p:spPr>
+          <a:xfrm>
+            <a:off x="818712" y="2222287"/>
+            <a:ext cx="5669174" cy="3636511"/>
+          </a:xfrm>
+        </p:spPr>
+        <p:txBody>
+          <a:bodyPr/>
+          <a:lstStyle/>
+          <a:p>
+            <a:r>
+              <a:rPr lang="es-CL" dirty="0"/>
+              <a:t>India – 84.7% de los 249 millones de viviendas (Censo 2001)</a:t>
+            </a:r>
+          </a:p>
+          <a:p>
+            <a:r>
+              <a:rPr lang="es-CL" dirty="0"/>
+              <a:t>México – 80% de los 22 millones de viviendas (Censo 2000)</a:t>
+            </a:r>
+          </a:p>
+        </p:txBody>
+      </p:sp>
+      <p:pic>
+        <p:nvPicPr>
+          <p:cNvPr id="5" name="Picture 4">
+            <a:extLst>
+              <a:ext uri="{FF2B5EF4-FFF2-40B4-BE49-F238E27FC236}">
+                <a16:creationId xmlns:a16="http://schemas.microsoft.com/office/drawing/2014/main" id="{5D070CE7-8EA6-4620-B2B7-0CF4A3587806}"/>
+              </a:ext>
+            </a:extLst>
+          </p:cNvPr>
+          <p:cNvPicPr>
+            <a:picLocks noChangeAspect="1"/>
+          </p:cNvPicPr>
+          <p:nvPr/>
+        </p:nvPicPr>
+        <p:blipFill>
+          <a:blip r:embed="rId2">
+            <a:extLst>
+              <a:ext uri="{28A0092B-C50C-407E-A947-70E740481C1C}">
+                <a14:useLocalDpi xmlns:a14="http://schemas.microsoft.com/office/drawing/2010/main" val="0"/>
+              </a:ext>
+            </a:extLst>
+          </a:blip>
+          <a:stretch>
+            <a:fillRect/>
+          </a:stretch>
+        </p:blipFill>
+        <p:spPr>
+          <a:xfrm>
+            <a:off x="6663871" y="2023053"/>
+            <a:ext cx="5400000" cy="4778491"/>
+          </a:xfrm>
+          <a:prstGeom prst="rect">
+            <a:avLst/>
+          </a:prstGeom>
+        </p:spPr>
+      </p:pic>
+    </p:spTree>
+    <p:extLst>
+      <p:ext uri="{BB962C8B-B14F-4D97-AF65-F5344CB8AC3E}">
+        <p14:creationId xmlns:p14="http://schemas.microsoft.com/office/powerpoint/2010/main" val="1223577235"/>
+      </p:ext>
+    </p:extLst>
+  </p:cSld>
+  <p:clrMapOvr>
+    <a:masterClrMapping/>
+  </p:clrMapOvr>
+</p:sld>
+</file>
+
+<file path=ppt/slides/slide14.xml><?xml version="1.0" encoding="utf-8"?>
+<p:sld xmlns:a="http://schemas.openxmlformats.org/drawingml/2006/main" xmlns:r="http://schemas.openxmlformats.org/officeDocument/2006/relationships" xmlns:p="http://schemas.openxmlformats.org/presentationml/2006/main">
+  <p:cSld>
+    <p:spTree>
+      <p:nvGrpSpPr>
+        <p:cNvPr id="1" name=""/>
+        <p:cNvGrpSpPr/>
+        <p:nvPr/>
+      </p:nvGrpSpPr>
+      <p:grpSpPr>
+        <a:xfrm>
+          <a:off x="0" y="0"/>
+          <a:ext cx="0" cy="0"/>
+          <a:chOff x="0" y="0"/>
+          <a:chExt cx="0" cy="0"/>
+        </a:xfrm>
+      </p:grpSpPr>
+      <p:pic>
+        <p:nvPicPr>
+          <p:cNvPr id="7" name="Content Placeholder 6">
+            <a:extLst>
+              <a:ext uri="{FF2B5EF4-FFF2-40B4-BE49-F238E27FC236}">
+                <a16:creationId xmlns:a16="http://schemas.microsoft.com/office/drawing/2014/main" id="{89BBC492-7091-4548-A170-30F4A8AD8468}"/>
+              </a:ext>
+            </a:extLst>
+          </p:cNvPr>
+          <p:cNvPicPr>
+            <a:picLocks noGrp="1" noChangeAspect="1"/>
+          </p:cNvPicPr>
+          <p:nvPr>
+            <p:ph idx="1"/>
+          </p:nvPr>
+        </p:nvPicPr>
+        <p:blipFill>
+          <a:blip r:embed="rId2">
+            <a:extLst>
+              <a:ext uri="{28A0092B-C50C-407E-A947-70E740481C1C}">
+                <a14:useLocalDpi xmlns:a14="http://schemas.microsoft.com/office/drawing/2010/main" val="0"/>
+              </a:ext>
+            </a:extLst>
+          </a:blip>
+          <a:stretch>
+            <a:fillRect/>
+          </a:stretch>
+        </p:blipFill>
+        <p:spPr>
+          <a:xfrm>
+            <a:off x="3149566" y="2349000"/>
+            <a:ext cx="5892865" cy="3960000"/>
+          </a:xfrm>
+        </p:spPr>
+      </p:pic>
+      <p:sp>
+        <p:nvSpPr>
+          <p:cNvPr id="4" name="Título 1">
+            <a:extLst>
+              <a:ext uri="{FF2B5EF4-FFF2-40B4-BE49-F238E27FC236}">
+                <a16:creationId xmlns:a16="http://schemas.microsoft.com/office/drawing/2014/main" id="{AF663B75-FE4D-466B-83D6-4E6417C766A1}"/>
+              </a:ext>
+            </a:extLst>
+          </p:cNvPr>
+          <p:cNvSpPr>
+            <a:spLocks noGrp="1"/>
+          </p:cNvSpPr>
+          <p:nvPr>
+            <p:ph type="title"/>
+          </p:nvPr>
+        </p:nvSpPr>
+        <p:spPr>
+          <a:xfrm>
+            <a:off x="809625" y="447675"/>
+            <a:ext cx="10572750" cy="969963"/>
+          </a:xfrm>
+        </p:spPr>
+        <p:txBody>
+          <a:bodyPr/>
+          <a:lstStyle/>
+          <a:p>
+            <a:r>
+              <a:rPr lang="es-CL" dirty="0"/>
+              <a:t>USO EN EL MUNDO</a:t>
+            </a:r>
+          </a:p>
+        </p:txBody>
+      </p:sp>
+      <p:sp>
+        <p:nvSpPr>
+          <p:cNvPr id="5" name="TextBox 4">
+            <a:extLst>
+              <a:ext uri="{FF2B5EF4-FFF2-40B4-BE49-F238E27FC236}">
+                <a16:creationId xmlns:a16="http://schemas.microsoft.com/office/drawing/2014/main" id="{5E983FE7-9FBA-4F76-9E08-C85BE4B1B9DE}"/>
+              </a:ext>
+            </a:extLst>
+          </p:cNvPr>
+          <p:cNvSpPr txBox="1"/>
+          <p:nvPr/>
+        </p:nvSpPr>
+        <p:spPr>
+          <a:xfrm>
+            <a:off x="4212312" y="6410812"/>
+            <a:ext cx="3767377" cy="307777"/>
+          </a:xfrm>
+          <a:prstGeom prst="rect">
+            <a:avLst/>
+          </a:prstGeom>
+          <a:noFill/>
+        </p:spPr>
+        <p:txBody>
+          <a:bodyPr wrap="none" rtlCol="0">
+            <a:spAutoFit/>
+          </a:bodyPr>
+          <a:lstStyle/>
+          <a:p>
+            <a:pPr algn="ctr"/>
+            <a:r>
+              <a:rPr lang="es-CL" sz="1400" dirty="0">
+                <a:solidFill>
+                  <a:schemeClr val="tx2">
+                    <a:lumMod val="50000"/>
+                  </a:schemeClr>
+                </a:solidFill>
+              </a:rPr>
+              <a:t>Ciudad amurallada de Shibam, Yemen.</a:t>
+            </a:r>
+            <a:endParaRPr lang="es-MX" sz="1400" dirty="0">
+              <a:solidFill>
+                <a:schemeClr val="tx2">
+                  <a:lumMod val="50000"/>
+                </a:schemeClr>
+              </a:solidFill>
+            </a:endParaRPr>
+          </a:p>
+        </p:txBody>
+      </p:sp>
+    </p:spTree>
+    <p:extLst>
+      <p:ext uri="{BB962C8B-B14F-4D97-AF65-F5344CB8AC3E}">
+        <p14:creationId xmlns:p14="http://schemas.microsoft.com/office/powerpoint/2010/main" val="2474401624"/>
+      </p:ext>
+    </p:extLst>
+  </p:cSld>
+  <p:clrMapOvr>
+    <a:masterClrMapping/>
+  </p:clrMapOvr>
+</p:sld>
+</file>
+
+<file path=ppt/slides/slide15.xml><?xml version="1.0" encoding="utf-8"?>
+<p:sld xmlns:a="http://schemas.openxmlformats.org/drawingml/2006/main" xmlns:r="http://schemas.openxmlformats.org/officeDocument/2006/relationships" xmlns:p="http://schemas.openxmlformats.org/presentationml/2006/main">
+  <p:cSld>
+    <p:spTree>
+      <p:nvGrpSpPr>
+        <p:cNvPr id="1" name=""/>
+        <p:cNvGrpSpPr/>
+        <p:nvPr/>
+      </p:nvGrpSpPr>
+      <p:grpSpPr>
+        <a:xfrm>
+          <a:off x="0" y="0"/>
+          <a:ext cx="0" cy="0"/>
+          <a:chOff x="0" y="0"/>
+          <a:chExt cx="0" cy="0"/>
+        </a:xfrm>
+      </p:grpSpPr>
+      <p:pic>
+        <p:nvPicPr>
+          <p:cNvPr id="7" name="Content Placeholder 6">
+            <a:extLst>
+              <a:ext uri="{FF2B5EF4-FFF2-40B4-BE49-F238E27FC236}">
+                <a16:creationId xmlns:a16="http://schemas.microsoft.com/office/drawing/2014/main" id="{735AF198-C2B6-4398-885E-65996DC38AD3}"/>
+              </a:ext>
+            </a:extLst>
+          </p:cNvPr>
+          <p:cNvPicPr>
+            <a:picLocks noGrp="1" noChangeAspect="1"/>
+          </p:cNvPicPr>
+          <p:nvPr>
+            <p:ph idx="1"/>
+          </p:nvPr>
+        </p:nvPicPr>
+        <p:blipFill>
+          <a:blip r:embed="rId2">
+            <a:extLst>
+              <a:ext uri="{28A0092B-C50C-407E-A947-70E740481C1C}">
+                <a14:useLocalDpi xmlns:a14="http://schemas.microsoft.com/office/drawing/2010/main" val="0"/>
+              </a:ext>
+            </a:extLst>
+          </a:blip>
+          <a:stretch>
+            <a:fillRect/>
+          </a:stretch>
+        </p:blipFill>
+        <p:spPr>
+          <a:xfrm>
+            <a:off x="3436691" y="2349000"/>
+            <a:ext cx="5318617" cy="3960000"/>
+          </a:xfrm>
+        </p:spPr>
+      </p:pic>
+      <p:sp>
+        <p:nvSpPr>
+          <p:cNvPr id="4" name="Título 1">
+            <a:extLst>
+              <a:ext uri="{FF2B5EF4-FFF2-40B4-BE49-F238E27FC236}">
+                <a16:creationId xmlns:a16="http://schemas.microsoft.com/office/drawing/2014/main" id="{31AAC927-8005-4692-9074-BEF9323C0B0E}"/>
+              </a:ext>
+            </a:extLst>
+          </p:cNvPr>
+          <p:cNvSpPr>
+            <a:spLocks noGrp="1"/>
+          </p:cNvSpPr>
+          <p:nvPr>
+            <p:ph type="title"/>
+          </p:nvPr>
+        </p:nvSpPr>
+        <p:spPr>
+          <a:xfrm>
+            <a:off x="809625" y="447675"/>
+            <a:ext cx="10572750" cy="969963"/>
+          </a:xfrm>
+        </p:spPr>
+        <p:txBody>
+          <a:bodyPr/>
+          <a:lstStyle/>
+          <a:p>
+            <a:r>
+              <a:rPr lang="es-CL" dirty="0"/>
+              <a:t>USO EN EL MUNDO</a:t>
+            </a:r>
+          </a:p>
+        </p:txBody>
+      </p:sp>
+      <p:sp>
+        <p:nvSpPr>
+          <p:cNvPr id="5" name="TextBox 4">
+            <a:extLst>
+              <a:ext uri="{FF2B5EF4-FFF2-40B4-BE49-F238E27FC236}">
+                <a16:creationId xmlns:a16="http://schemas.microsoft.com/office/drawing/2014/main" id="{5EFFD271-0659-4DF5-B02E-6B0BD807F52A}"/>
+              </a:ext>
+            </a:extLst>
+          </p:cNvPr>
+          <p:cNvSpPr txBox="1"/>
+          <p:nvPr/>
+        </p:nvSpPr>
+        <p:spPr>
+          <a:xfrm>
+            <a:off x="4431123" y="6410325"/>
+            <a:ext cx="3329758" cy="307777"/>
+          </a:xfrm>
+          <a:prstGeom prst="rect">
+            <a:avLst/>
+          </a:prstGeom>
+          <a:noFill/>
+        </p:spPr>
+        <p:txBody>
+          <a:bodyPr wrap="none" rtlCol="0">
+            <a:spAutoFit/>
+          </a:bodyPr>
+          <a:lstStyle/>
+          <a:p>
+            <a:pPr algn="ctr"/>
+            <a:r>
+              <a:rPr lang="es-CL" sz="1400" dirty="0">
+                <a:solidFill>
+                  <a:schemeClr val="tx2">
+                    <a:lumMod val="50000"/>
+                  </a:schemeClr>
+                </a:solidFill>
+              </a:rPr>
+              <a:t>Edificio Monadnock, Chicago. 1981.</a:t>
+            </a:r>
+            <a:endParaRPr lang="es-MX" sz="1400" dirty="0">
+              <a:solidFill>
+                <a:schemeClr val="tx2">
+                  <a:lumMod val="50000"/>
+                </a:schemeClr>
+              </a:solidFill>
+            </a:endParaRPr>
+          </a:p>
+        </p:txBody>
+      </p:sp>
+    </p:spTree>
+    <p:extLst>
+      <p:ext uri="{BB962C8B-B14F-4D97-AF65-F5344CB8AC3E}">
+        <p14:creationId xmlns:p14="http://schemas.microsoft.com/office/powerpoint/2010/main" val="2745863721"/>
+      </p:ext>
+    </p:extLst>
+  </p:cSld>
+  <p:clrMapOvr>
+    <a:masterClrMapping/>
+  </p:clrMapOvr>
+</p:sld>
+</file>
+
+<file path=ppt/slides/slide16.xml><?xml version="1.0" encoding="utf-8"?>
+<p:sld xmlns:a="http://schemas.openxmlformats.org/drawingml/2006/main" xmlns:r="http://schemas.openxmlformats.org/officeDocument/2006/relationships" xmlns:p="http://schemas.openxmlformats.org/presentationml/2006/main">
+  <p:cSld>
+    <p:spTree>
+      <p:nvGrpSpPr>
+        <p:cNvPr id="1" name=""/>
+        <p:cNvGrpSpPr/>
+        <p:nvPr/>
+      </p:nvGrpSpPr>
+      <p:grpSpPr>
+        <a:xfrm>
+          <a:off x="0" y="0"/>
+          <a:ext cx="0" cy="0"/>
+          <a:chOff x="0" y="0"/>
+          <a:chExt cx="0" cy="0"/>
+        </a:xfrm>
+      </p:grpSpPr>
+      <p:sp>
+        <p:nvSpPr>
+          <p:cNvPr id="4" name="Título 1">
+            <a:extLst>
+              <a:ext uri="{FF2B5EF4-FFF2-40B4-BE49-F238E27FC236}">
+                <a16:creationId xmlns:a16="http://schemas.microsoft.com/office/drawing/2014/main" id="{41C5A8C7-7AE3-492F-AF8A-097B5AF713CD}"/>
+              </a:ext>
+            </a:extLst>
+          </p:cNvPr>
+          <p:cNvSpPr>
+            <a:spLocks noGrp="1"/>
+          </p:cNvSpPr>
+          <p:nvPr>
+            <p:ph type="title"/>
+          </p:nvPr>
+        </p:nvSpPr>
+        <p:spPr>
+          <a:xfrm>
+            <a:off x="809625" y="447675"/>
+            <a:ext cx="10572750" cy="969963"/>
+          </a:xfrm>
+        </p:spPr>
+        <p:txBody>
+          <a:bodyPr/>
+          <a:lstStyle/>
+          <a:p>
+            <a:r>
+              <a:rPr lang="es-CL" dirty="0"/>
+              <a:t>USO EN EL MUNDO</a:t>
+            </a:r>
+          </a:p>
+        </p:txBody>
+      </p:sp>
+      <p:sp>
+        <p:nvSpPr>
+          <p:cNvPr id="5" name="TextBox 4">
+            <a:extLst>
+              <a:ext uri="{FF2B5EF4-FFF2-40B4-BE49-F238E27FC236}">
+                <a16:creationId xmlns:a16="http://schemas.microsoft.com/office/drawing/2014/main" id="{40915CB3-0140-408F-B249-4ADFAF02F3C6}"/>
+              </a:ext>
+            </a:extLst>
+          </p:cNvPr>
+          <p:cNvSpPr txBox="1"/>
+          <p:nvPr/>
+        </p:nvSpPr>
+        <p:spPr>
+          <a:xfrm>
+            <a:off x="4722872" y="6410812"/>
+            <a:ext cx="2746266" cy="307777"/>
+          </a:xfrm>
+          <a:prstGeom prst="rect">
+            <a:avLst/>
+          </a:prstGeom>
+          <a:noFill/>
+        </p:spPr>
+        <p:txBody>
+          <a:bodyPr wrap="none" rtlCol="0">
+            <a:spAutoFit/>
+          </a:bodyPr>
+          <a:lstStyle/>
+          <a:p>
+            <a:pPr algn="ctr"/>
+            <a:r>
+              <a:rPr lang="es-CL" sz="1400" dirty="0">
+                <a:solidFill>
+                  <a:schemeClr val="tx2">
+                    <a:lumMod val="50000"/>
+                  </a:schemeClr>
+                </a:solidFill>
+              </a:rPr>
+              <a:t>Catedral de San Vito, Praga. </a:t>
+            </a:r>
+            <a:endParaRPr lang="es-MX" sz="1400" dirty="0">
+              <a:solidFill>
+                <a:schemeClr val="tx2">
+                  <a:lumMod val="50000"/>
+                </a:schemeClr>
+              </a:solidFill>
+            </a:endParaRPr>
+          </a:p>
+        </p:txBody>
+      </p:sp>
+      <p:pic>
+        <p:nvPicPr>
+          <p:cNvPr id="11" name="Content Placeholder 10">
+            <a:extLst>
+              <a:ext uri="{FF2B5EF4-FFF2-40B4-BE49-F238E27FC236}">
+                <a16:creationId xmlns:a16="http://schemas.microsoft.com/office/drawing/2014/main" id="{369A47B0-64AC-43D0-A8B8-D63C04AB72E2}"/>
+              </a:ext>
+            </a:extLst>
+          </p:cNvPr>
+          <p:cNvPicPr>
+            <a:picLocks noGrp="1" noChangeAspect="1"/>
+          </p:cNvPicPr>
+          <p:nvPr>
+            <p:ph idx="1"/>
+          </p:nvPr>
+        </p:nvPicPr>
+        <p:blipFill>
+          <a:blip r:embed="rId2">
+            <a:extLst>
+              <a:ext uri="{28A0092B-C50C-407E-A947-70E740481C1C}">
+                <a14:useLocalDpi xmlns:a14="http://schemas.microsoft.com/office/drawing/2010/main" val="0"/>
+              </a:ext>
+            </a:extLst>
+          </a:blip>
+          <a:stretch>
+            <a:fillRect/>
+          </a:stretch>
+        </p:blipFill>
+        <p:spPr>
+          <a:xfrm>
+            <a:off x="2585359" y="2349000"/>
+            <a:ext cx="7021279" cy="3960000"/>
+          </a:xfrm>
+        </p:spPr>
+      </p:pic>
+    </p:spTree>
+    <p:extLst>
+      <p:ext uri="{BB962C8B-B14F-4D97-AF65-F5344CB8AC3E}">
+        <p14:creationId xmlns:p14="http://schemas.microsoft.com/office/powerpoint/2010/main" val="900002428"/>
+      </p:ext>
+    </p:extLst>
+  </p:cSld>
+  <p:clrMapOvr>
+    <a:masterClrMapping/>
+  </p:clrMapOvr>
+</p:sld>
+</file>
+
+<file path=ppt/slides/slide17.xml><?xml version="1.0" encoding="utf-8"?>
+<p:sld xmlns:a="http://schemas.openxmlformats.org/drawingml/2006/main" xmlns:r="http://schemas.openxmlformats.org/officeDocument/2006/relationships" xmlns:p="http://schemas.openxmlformats.org/presentationml/2006/main">
+  <p:cSld>
+    <p:spTree>
+      <p:nvGrpSpPr>
+        <p:cNvPr id="1" name=""/>
+        <p:cNvGrpSpPr/>
+        <p:nvPr/>
+      </p:nvGrpSpPr>
+      <p:grpSpPr>
+        <a:xfrm>
+          <a:off x="0" y="0"/>
+          <a:ext cx="0" cy="0"/>
+          <a:chOff x="0" y="0"/>
+          <a:chExt cx="0" cy="0"/>
+        </a:xfrm>
+      </p:grpSpPr>
+      <p:pic>
+        <p:nvPicPr>
+          <p:cNvPr id="7" name="Content Placeholder 6">
+            <a:extLst>
+              <a:ext uri="{FF2B5EF4-FFF2-40B4-BE49-F238E27FC236}">
+                <a16:creationId xmlns:a16="http://schemas.microsoft.com/office/drawing/2014/main" id="{CDF5B293-ABE9-4857-BF86-6C9774B57C84}"/>
+              </a:ext>
+            </a:extLst>
+          </p:cNvPr>
+          <p:cNvPicPr>
+            <a:picLocks noGrp="1" noChangeAspect="1"/>
+          </p:cNvPicPr>
+          <p:nvPr>
+            <p:ph idx="1"/>
+          </p:nvPr>
+        </p:nvPicPr>
+        <p:blipFill>
+          <a:blip r:embed="rId2">
+            <a:extLst>
+              <a:ext uri="{28A0092B-C50C-407E-A947-70E740481C1C}">
+                <a14:useLocalDpi xmlns:a14="http://schemas.microsoft.com/office/drawing/2010/main" val="0"/>
+              </a:ext>
+            </a:extLst>
+          </a:blip>
+          <a:stretch>
+            <a:fillRect/>
+          </a:stretch>
+        </p:blipFill>
+        <p:spPr>
+          <a:xfrm>
+            <a:off x="400686" y="2952000"/>
+            <a:ext cx="11390626" cy="2916000"/>
+          </a:xfrm>
+        </p:spPr>
+      </p:pic>
+      <p:sp>
+        <p:nvSpPr>
+          <p:cNvPr id="4" name="Título 1">
+            <a:extLst>
+              <a:ext uri="{FF2B5EF4-FFF2-40B4-BE49-F238E27FC236}">
+                <a16:creationId xmlns:a16="http://schemas.microsoft.com/office/drawing/2014/main" id="{123C2692-B572-4835-88B7-04E347E4D3F8}"/>
+              </a:ext>
+            </a:extLst>
+          </p:cNvPr>
+          <p:cNvSpPr>
+            <a:spLocks noGrp="1"/>
+          </p:cNvSpPr>
+          <p:nvPr>
+            <p:ph type="title"/>
+          </p:nvPr>
+        </p:nvSpPr>
+        <p:spPr>
+          <a:xfrm>
+            <a:off x="809625" y="447675"/>
+            <a:ext cx="10572750" cy="969963"/>
+          </a:xfrm>
+        </p:spPr>
+        <p:txBody>
+          <a:bodyPr/>
+          <a:lstStyle/>
+          <a:p>
+            <a:r>
+              <a:rPr lang="es-CL" dirty="0"/>
+              <a:t>USO EN EL MUNDO</a:t>
+            </a:r>
+          </a:p>
+        </p:txBody>
+      </p:sp>
+      <p:sp>
+        <p:nvSpPr>
+          <p:cNvPr id="5" name="TextBox 4">
+            <a:extLst>
+              <a:ext uri="{FF2B5EF4-FFF2-40B4-BE49-F238E27FC236}">
+                <a16:creationId xmlns:a16="http://schemas.microsoft.com/office/drawing/2014/main" id="{5868180A-6D80-471B-88EE-0AECE2644E27}"/>
+              </a:ext>
+            </a:extLst>
+          </p:cNvPr>
+          <p:cNvSpPr txBox="1"/>
+          <p:nvPr/>
+        </p:nvSpPr>
+        <p:spPr>
+          <a:xfrm>
+            <a:off x="4637109" y="6126587"/>
+            <a:ext cx="2917786" cy="307777"/>
+          </a:xfrm>
+          <a:prstGeom prst="rect">
+            <a:avLst/>
+          </a:prstGeom>
+          <a:noFill/>
+        </p:spPr>
+        <p:txBody>
+          <a:bodyPr wrap="none" rtlCol="0">
+            <a:spAutoFit/>
+          </a:bodyPr>
+          <a:lstStyle/>
+          <a:p>
+            <a:pPr algn="ctr"/>
+            <a:r>
+              <a:rPr lang="es-CL" sz="1400" dirty="0">
+                <a:solidFill>
+                  <a:schemeClr val="tx2">
+                    <a:lumMod val="50000"/>
+                  </a:schemeClr>
+                </a:solidFill>
+              </a:rPr>
+              <a:t>Ciudad de Dubrovnik, Croacia.</a:t>
+            </a:r>
+            <a:endParaRPr lang="es-MX" sz="1400" dirty="0">
+              <a:solidFill>
+                <a:schemeClr val="tx2">
+                  <a:lumMod val="50000"/>
+                </a:schemeClr>
+              </a:solidFill>
+            </a:endParaRPr>
+          </a:p>
+        </p:txBody>
+      </p:sp>
+    </p:spTree>
+    <p:extLst>
+      <p:ext uri="{BB962C8B-B14F-4D97-AF65-F5344CB8AC3E}">
+        <p14:creationId xmlns:p14="http://schemas.microsoft.com/office/powerpoint/2010/main" val="929219740"/>
+      </p:ext>
+    </p:extLst>
+  </p:cSld>
+  <p:clrMapOvr>
+    <a:masterClrMapping/>
+  </p:clrMapOvr>
+</p:sld>
+</file>
+
+<file path=ppt/slides/slide18.xml><?xml version="1.0" encoding="utf-8"?>
+<p:sld xmlns:a="http://schemas.openxmlformats.org/drawingml/2006/main" xmlns:r="http://schemas.openxmlformats.org/officeDocument/2006/relationships" xmlns:p="http://schemas.openxmlformats.org/presentationml/2006/main">
+  <p:cSld>
+    <p:spTree>
+      <p:nvGrpSpPr>
+        <p:cNvPr id="1" name=""/>
+        <p:cNvGrpSpPr/>
+        <p:nvPr/>
+      </p:nvGrpSpPr>
+      <p:grpSpPr>
+        <a:xfrm>
+          <a:off x="0" y="0"/>
+          <a:ext cx="0" cy="0"/>
+          <a:chOff x="0" y="0"/>
+          <a:chExt cx="0" cy="0"/>
+        </a:xfrm>
+      </p:grpSpPr>
+      <p:sp>
+        <p:nvSpPr>
+          <p:cNvPr id="2" name="Título 1">
+            <a:extLst>
+              <a:ext uri="{FF2B5EF4-FFF2-40B4-BE49-F238E27FC236}">
+                <a16:creationId xmlns:a16="http://schemas.microsoft.com/office/drawing/2014/main" id="{269D34A6-CEA9-4551-A486-097F07B05AD9}"/>
+              </a:ext>
+            </a:extLst>
+          </p:cNvPr>
+          <p:cNvSpPr>
+            <a:spLocks noGrp="1"/>
+          </p:cNvSpPr>
+          <p:nvPr>
+            <p:ph type="title"/>
+          </p:nvPr>
+        </p:nvSpPr>
+        <p:spPr/>
+        <p:txBody>
+          <a:bodyPr/>
+          <a:lstStyle/>
+          <a:p>
+            <a:r>
+              <a:rPr lang="es-CL" dirty="0"/>
+              <a:t>CUBICACIONES</a:t>
+            </a:r>
+          </a:p>
+        </p:txBody>
+      </p:sp>
+      <p:sp>
+        <p:nvSpPr>
+          <p:cNvPr id="3" name="Marcador de contenido 2">
+            <a:extLst>
+              <a:ext uri="{FF2B5EF4-FFF2-40B4-BE49-F238E27FC236}">
+                <a16:creationId xmlns:a16="http://schemas.microsoft.com/office/drawing/2014/main" id="{0AFA8CF1-302B-4FA8-8928-4F60FD8E8582}"/>
+              </a:ext>
+            </a:extLst>
+          </p:cNvPr>
+          <p:cNvSpPr>
+            <a:spLocks noGrp="1"/>
+          </p:cNvSpPr>
+          <p:nvPr>
+            <p:ph idx="1"/>
+          </p:nvPr>
+        </p:nvSpPr>
+        <p:spPr/>
+        <p:txBody>
+          <a:bodyPr/>
+          <a:lstStyle/>
+          <a:p>
+            <a:endParaRPr lang="es-CL"/>
+          </a:p>
+        </p:txBody>
+      </p:sp>
+    </p:spTree>
+    <p:extLst>
+      <p:ext uri="{BB962C8B-B14F-4D97-AF65-F5344CB8AC3E}">
+        <p14:creationId xmlns:p14="http://schemas.microsoft.com/office/powerpoint/2010/main" val="2217409196"/>
+      </p:ext>
+    </p:extLst>
+  </p:cSld>
+  <p:clrMapOvr>
+    <a:masterClrMapping/>
+  </p:clrMapOvr>
+</p:sld>
+</file>
+
+<file path=ppt/slides/slide19.xml><?xml version="1.0" encoding="utf-8"?>
+<p:sld xmlns:a="http://schemas.openxmlformats.org/drawingml/2006/main" xmlns:r="http://schemas.openxmlformats.org/officeDocument/2006/relationships" xmlns:p="http://schemas.openxmlformats.org/presentationml/2006/main">
+  <p:cSld>
+    <p:spTree>
+      <p:nvGrpSpPr>
+        <p:cNvPr id="1" name=""/>
+        <p:cNvGrpSpPr/>
+        <p:nvPr/>
+      </p:nvGrpSpPr>
+      <p:grpSpPr>
+        <a:xfrm>
+          <a:off x="0" y="0"/>
+          <a:ext cx="0" cy="0"/>
+          <a:chOff x="0" y="0"/>
+          <a:chExt cx="0" cy="0"/>
+        </a:xfrm>
+      </p:grpSpPr>
       <p:sp>
         <p:nvSpPr>
           <p:cNvPr id="2" name="Título 1">
@@ -5758,7 +6843,7 @@
           <a:p>
             <a:r>
               <a:rPr lang="es-CL" dirty="0"/>
-              <a:t>CONCLUSIONES</a:t>
+              <a:t>REFERENCIAS</a:t>
             </a:r>
           </a:p>
         </p:txBody>
@@ -5779,12 +6864,97 @@
             <p:ph idx="1"/>
           </p:nvPr>
         </p:nvSpPr>
-        <p:spPr/>
-        <p:txBody>
-          <a:bodyPr/>
-          <a:lstStyle/>
-          <a:p>
-            <a:endParaRPr lang="es-CL"/>
+        <p:spPr>
+          <a:xfrm>
+            <a:off x="551544" y="2235199"/>
+            <a:ext cx="11161486" cy="4513943"/>
+          </a:xfrm>
+        </p:spPr>
+        <p:txBody>
+          <a:bodyPr>
+            <a:normAutofit fontScale="70000" lnSpcReduction="20000"/>
+          </a:bodyPr>
+          <a:lstStyle/>
+          <a:p>
+            <a:r>
+              <a:rPr lang="es-CL" sz="2000" dirty="0"/>
+              <a:t>[1] Thomas Sturm M, 2018. Apuntes de cátedra curso CI5223 Diseño de Albañilería Estructural, Facultad de Ciencias Físicas y 	Matemáticas, U. de Chile.</a:t>
+            </a:r>
+          </a:p>
+          <a:p>
+            <a:r>
+              <a:rPr lang="es-CL" sz="2000" dirty="0"/>
+              <a:t>[2] NCh353.Of2000. Construcción - Cubicación de obras de edificación - Requisitos. (2000)</a:t>
+            </a:r>
+          </a:p>
+          <a:p>
+            <a:r>
+              <a:rPr lang="es-CL" sz="2000" dirty="0"/>
+              <a:t>[3] NCh1928.Of93. Albañilería armada - Requisitos para el diseño y cálculo. (1993)</a:t>
+            </a:r>
+          </a:p>
+          <a:p>
+            <a:r>
+              <a:rPr lang="es-CL" sz="2000" dirty="0"/>
+              <a:t>[4] NCh2123.Of97. Albañilería confinada - Requisitos de diseño y cálculo. (1997)</a:t>
+            </a:r>
+          </a:p>
+          <a:p>
+            <a:r>
+              <a:rPr lang="es-CL" sz="2000" dirty="0"/>
+              <a:t>[5] Censo Chile 2002. www.ine.cl/estadisticas/censos/censos-de-poblacion-y-vivienda [Consulta: 02/12/2018]</a:t>
+            </a:r>
+          </a:p>
+          <a:p>
+            <a:r>
+              <a:rPr lang="es-CL" sz="2000" dirty="0"/>
+              <a:t>[6] Ordenanza General de Urbanismo y Construcción. Ministerio de vivienda y urbanismo. (1992)</a:t>
+            </a:r>
+          </a:p>
+          <a:p>
+            <a:r>
+              <a:rPr lang="es-CL" sz="2000" dirty="0"/>
+              <a:t>[7] Edificio ex arsenales de guerra. www.monumentos.cl/monumentos-historicos/edificio-ex-arsenales-guerra [Consulta: 		02/12/2018]</a:t>
+            </a:r>
+          </a:p>
+          <a:p>
+            <a:r>
+              <a:rPr lang="es-CL" sz="2000" dirty="0"/>
+              <a:t>[8] Iglesia y convento de San Francisco. www.monumentos.cl/monumentos-historicos/iglesia-convento-san-francisco 			[Consulta: 02/12/2018]</a:t>
+            </a:r>
+          </a:p>
+          <a:p>
+            <a:r>
+              <a:rPr lang="es-CL" sz="2000" dirty="0"/>
+              <a:t>[9] Catedral de Santiago. www.monumentos.cl/monumentos-historicos/catedral-santiago [Consulta: 03/12/2018]</a:t>
+            </a:r>
+          </a:p>
+          <a:p>
+            <a:r>
+              <a:rPr lang="es-CL" sz="2000" dirty="0"/>
+              <a:t>[10] Ciudad de amurallada de Shibam. whc.unesco.org/en/list/192/ [Consulta: 03/12/2018]</a:t>
+            </a:r>
+          </a:p>
+          <a:p>
+            <a:r>
+              <a:rPr lang="es-CL" sz="2000" dirty="0"/>
+              <a:t>[11] Edificio Monadnock. npgallery.nps.gov/NRHP/monadnock-block [Consulta: 03/12/2018]</a:t>
+            </a:r>
+          </a:p>
+          <a:p>
+            <a:r>
+              <a:rPr lang="es-CL" sz="2000" dirty="0"/>
+              <a:t>[12] Catedral de San Vito. www.prague.eu/castillo-de-praga-catedral-de-san-vito [Consulta: 03/12/2018]</a:t>
+            </a:r>
+          </a:p>
+          <a:p>
+            <a:r>
+              <a:rPr lang="es-CL" sz="2000" dirty="0"/>
+              <a:t>[13] Ciudad vieja de Dubrovnik. whc.unesco.org/en/list/95/ [Consulta: 03/12/2018]</a:t>
+            </a:r>
+          </a:p>
+          <a:p>
+            <a:endParaRPr lang="es-CL" dirty="0"/>
           </a:p>
         </p:txBody>
       </p:sp>
@@ -5841,7 +7011,7 @@
           <a:p>
             <a:r>
               <a:rPr lang="es-CL" dirty="0"/>
-              <a:t>¿QUE ES LA ALBAÑILERÍA?</a:t>
+              <a:t>¿QUÉ ES LA ALBAÑILERÍA?</a:t>
             </a:r>
           </a:p>
         </p:txBody>
@@ -5886,7 +7056,7 @@
             </a:pPr>
             <a:r>
               <a:rPr lang="es-ES" dirty="0"/>
-              <a:t>albañilería: toda aquella obra formada por </a:t>
+              <a:t>Albañilería: toda aquella obra formada por </a:t>
             </a:r>
             <a:r>
               <a:rPr lang="es-ES" b="1" dirty="0"/>
@@ -6383,7 +7553,7 @@
           <a:p>
             <a:r>
               <a:rPr lang="es-CL" dirty="0"/>
-              <a:t>PROPIEDADES Y RECOMENDACIONES DE DISEÑO</a:t>
+              <a:t>PROPIEDADES</a:t>
             </a:r>
           </a:p>
         </p:txBody>
@@ -6445,10 +7615,10 @@
       </p:grpSpPr>
       <p:sp>
         <p:nvSpPr>
-          <p:cNvPr id="2" name="Título 1">
+          <p:cNvPr id="2" name="Title 1">
             <a:extLst>
               <a:ext uri="{FF2B5EF4-FFF2-40B4-BE49-F238E27FC236}">
-                <a16:creationId xmlns:a16="http://schemas.microsoft.com/office/drawing/2014/main" id="{456F0D27-4BB8-47E1-925D-1090CB2A99FE}"/>
+                <a16:creationId xmlns:a16="http://schemas.microsoft.com/office/drawing/2014/main" id="{712C55EE-6F74-4F8C-82DD-2B4A55C6A14D}"/>
               </a:ext>
             </a:extLst>
           </p:cNvPr>
@@ -6465,18 +7635,18 @@
           <a:lstStyle/>
           <a:p>
             <a:r>
-              <a:rPr lang="es-CL" dirty="0"/>
-              <a:t>NORMATIVA Y RECOMENDACIONES DE DISEÑO</a:t>
-            </a:r>
-          </a:p>
-        </p:txBody>
-      </p:sp>
-      <p:sp>
-        <p:nvSpPr>
-          <p:cNvPr id="3" name="Marcador de contenido 2">
+              <a:rPr lang="es-MX" dirty="0"/>
+              <a:t>RECOMENDACIONES DE DISEÑO</a:t>
+            </a:r>
+          </a:p>
+        </p:txBody>
+      </p:sp>
+      <p:sp>
+        <p:nvSpPr>
+          <p:cNvPr id="3" name="Content Placeholder 2">
             <a:extLst>
               <a:ext uri="{FF2B5EF4-FFF2-40B4-BE49-F238E27FC236}">
-                <a16:creationId xmlns:a16="http://schemas.microsoft.com/office/drawing/2014/main" id="{4DB436D6-A3D9-4D23-B070-9EE813E77E93}"/>
+                <a16:creationId xmlns:a16="http://schemas.microsoft.com/office/drawing/2014/main" id="{F1252A40-D53B-4B54-9E16-7CC866760F94}"/>
               </a:ext>
             </a:extLst>
           </p:cNvPr>
@@ -6492,14 +7662,14 @@
           <a:bodyPr/>
           <a:lstStyle/>
           <a:p>
-            <a:endParaRPr lang="es-CL"/>
+            <a:endParaRPr lang="es-MX"/>
           </a:p>
         </p:txBody>
       </p:sp>
     </p:spTree>
     <p:extLst>
       <p:ext uri="{BB962C8B-B14F-4D97-AF65-F5344CB8AC3E}">
-        <p14:creationId xmlns:p14="http://schemas.microsoft.com/office/powerpoint/2010/main" val="413490513"/>
+        <p14:creationId xmlns:p14="http://schemas.microsoft.com/office/powerpoint/2010/main" val="780976413"/>
       </p:ext>
     </p:extLst>
   </p:cSld>
@@ -6549,13 +7719,8 @@
           <a:p>
             <a:r>
               <a:rPr lang="es-CL" dirty="0"/>
-              <a:t>ESTRUCTURAS DE </a:t>
-            </a:r>
-            <a:r>
-              <a:rPr lang="es-CL" dirty="0" err="1"/>
-              <a:t>ALBAÑILERÍAs</a:t>
-            </a:r>
-            <a:endParaRPr lang="es-CL" dirty="0"/>
+              <a:t>ESTRUCTURAS DE ALBAÑILERÍA</a:t>
+            </a:r>
           </a:p>
         </p:txBody>
       </p:sp>
@@ -6626,7 +7791,7 @@
           <p:cNvPr id="2" name="Título 1">
             <a:extLst>
               <a:ext uri="{FF2B5EF4-FFF2-40B4-BE49-F238E27FC236}">
-                <a16:creationId xmlns:a16="http://schemas.microsoft.com/office/drawing/2014/main" id="{D1668D6C-A80F-4AF9-8196-AB531C5839C3}"/>
+                <a16:creationId xmlns:a16="http://schemas.microsoft.com/office/drawing/2014/main" id="{7963A088-C063-40F0-8AD2-8AAC6199450A}"/>
               </a:ext>
             </a:extLst>
           </p:cNvPr>
@@ -6644,7 +7809,7 @@
           <a:p>
             <a:r>
               <a:rPr lang="es-CL" dirty="0"/>
-              <a:t>ALBAÑILERÍA APLICADA A EDIFICIOS</a:t>
+              <a:t>USO EN CHILE</a:t>
             </a:r>
           </a:p>
         </p:txBody>
@@ -6654,7 +7819,7 @@
           <p:cNvPr id="3" name="Marcador de contenido 2">
             <a:extLst>
               <a:ext uri="{FF2B5EF4-FFF2-40B4-BE49-F238E27FC236}">
-                <a16:creationId xmlns:a16="http://schemas.microsoft.com/office/drawing/2014/main" id="{0096BE36-3AC5-4DB5-866A-1BFCB158F12D}"/>
+                <a16:creationId xmlns:a16="http://schemas.microsoft.com/office/drawing/2014/main" id="{22ABBA1F-64A6-4E9A-90FE-8AC824113733}"/>
               </a:ext>
             </a:extLst>
           </p:cNvPr>
@@ -6667,25 +7832,66 @@
         </p:nvSpPr>
         <p:spPr>
           <a:xfrm>
-            <a:off x="810000" y="2178744"/>
-            <a:ext cx="10554574" cy="3636511"/>
-          </a:xfrm>
-        </p:spPr>
-        <p:txBody>
-          <a:bodyPr anchor="t"/>
-          <a:lstStyle/>
-          <a:p>
-            <a:pPr marL="0" indent="0">
-              <a:buNone/>
-            </a:pPr>
+            <a:off x="818712" y="2222287"/>
+            <a:ext cx="4145174" cy="4188525"/>
+          </a:xfrm>
+        </p:spPr>
+        <p:txBody>
+          <a:bodyPr/>
+          <a:lstStyle/>
+          <a:p>
+            <a:pPr algn="just"/>
+            <a:r>
+              <a:rPr lang="es-CL" dirty="0"/>
+              <a:t>Principalmente en edificios de tipo unifamiliar y multifamiliar de uso habitacional, en su mayoría viviendas sociales. </a:t>
+            </a:r>
+          </a:p>
+          <a:p>
+            <a:pPr algn="just"/>
             <a:endParaRPr lang="es-CL" dirty="0"/>
           </a:p>
         </p:txBody>
       </p:sp>
+      <p:pic>
+        <p:nvPicPr>
+          <p:cNvPr id="5" name="Picture 4">
+            <a:extLst>
+              <a:ext uri="{FF2B5EF4-FFF2-40B4-BE49-F238E27FC236}">
+                <a16:creationId xmlns:a16="http://schemas.microsoft.com/office/drawing/2014/main" id="{CE0FF64E-1B11-4990-B2EF-96FFD4D45105}"/>
+              </a:ext>
+            </a:extLst>
+          </p:cNvPr>
+          <p:cNvPicPr>
+            <a:picLocks noChangeAspect="1"/>
+          </p:cNvPicPr>
+          <p:nvPr/>
+        </p:nvPicPr>
+        <p:blipFill>
+          <a:blip r:embed="rId2">
+            <a:extLst>
+              <a:ext uri="{28A0092B-C50C-407E-A947-70E740481C1C}">
+                <a14:useLocalDpi xmlns:a14="http://schemas.microsoft.com/office/drawing/2010/main" val="0"/>
+              </a:ext>
+            </a:extLst>
+          </a:blip>
+          <a:stretch>
+            <a:fillRect/>
+          </a:stretch>
+        </p:blipFill>
+        <p:spPr>
+          <a:xfrm>
+            <a:off x="6095999" y="2565737"/>
+            <a:ext cx="5309735" cy="3501624"/>
+          </a:xfrm>
+          <a:prstGeom prst="rect">
+            <a:avLst/>
+          </a:prstGeom>
+        </p:spPr>
+      </p:pic>
     </p:spTree>
     <p:extLst>
       <p:ext uri="{BB962C8B-B14F-4D97-AF65-F5344CB8AC3E}">
-        <p14:creationId xmlns:p14="http://schemas.microsoft.com/office/powerpoint/2010/main" val="4184555785"/>
+        <p14:creationId xmlns:p14="http://schemas.microsoft.com/office/powerpoint/2010/main" val="3365775483"/>
       </p:ext>
     </p:extLst>
   </p:cSld>
@@ -6714,10 +7920,10 @@
       </p:grpSpPr>
       <p:sp>
         <p:nvSpPr>
-          <p:cNvPr id="2" name="Título 1">
+          <p:cNvPr id="3" name="Content Placeholder 2">
             <a:extLst>
               <a:ext uri="{FF2B5EF4-FFF2-40B4-BE49-F238E27FC236}">
-                <a16:creationId xmlns:a16="http://schemas.microsoft.com/office/drawing/2014/main" id="{7963A088-C063-40F0-8AD2-8AAC6199450A}"/>
+                <a16:creationId xmlns:a16="http://schemas.microsoft.com/office/drawing/2014/main" id="{9AB0772D-26FD-480D-9962-B8235BB84C22}"/>
               </a:ext>
             </a:extLst>
           </p:cNvPr>
@@ -6725,27 +7931,39 @@
             <a:spLocks noGrp="1"/>
           </p:cNvSpPr>
           <p:nvPr>
-            <p:ph type="title"/>
-          </p:nvPr>
-        </p:nvSpPr>
-        <p:spPr/>
+            <p:ph idx="1"/>
+          </p:nvPr>
+        </p:nvSpPr>
+        <p:spPr>
+          <a:xfrm>
+            <a:off x="810000" y="2129430"/>
+            <a:ext cx="11083002" cy="970450"/>
+          </a:xfrm>
+        </p:spPr>
         <p:txBody>
           <a:bodyPr/>
           <a:lstStyle/>
           <a:p>
             <a:r>
+              <a:rPr lang="es-MX" dirty="0"/>
+              <a:t>Según </a:t>
+            </a:r>
+            <a:r>
               <a:rPr lang="es-CL" dirty="0"/>
-              <a:t>USO EN EL MUNDO</a:t>
-            </a:r>
-          </a:p>
-        </p:txBody>
-      </p:sp>
-      <p:sp>
-        <p:nvSpPr>
-          <p:cNvPr id="3" name="Marcador de contenido 2">
+              <a:t>CENSO 2002, 62 % viviendas albañilería.  En descenso en la actualidad</a:t>
+            </a:r>
+          </a:p>
+          <a:p>
+            <a:endParaRPr lang="es-MX" dirty="0"/>
+          </a:p>
+        </p:txBody>
+      </p:sp>
+      <p:sp>
+        <p:nvSpPr>
+          <p:cNvPr id="4" name="Título 1">
             <a:extLst>
               <a:ext uri="{FF2B5EF4-FFF2-40B4-BE49-F238E27FC236}">
-                <a16:creationId xmlns:a16="http://schemas.microsoft.com/office/drawing/2014/main" id="{22ABBA1F-64A6-4E9A-90FE-8AC824113733}"/>
+                <a16:creationId xmlns:a16="http://schemas.microsoft.com/office/drawing/2014/main" id="{42EDE288-8568-4696-BD15-9F3882D3D65A}"/>
               </a:ext>
             </a:extLst>
           </p:cNvPr>
@@ -6753,22 +7971,191 @@
             <a:spLocks noGrp="1"/>
           </p:cNvSpPr>
           <p:nvPr>
-            <p:ph idx="1"/>
-          </p:nvPr>
-        </p:nvSpPr>
-        <p:spPr/>
+            <p:ph type="title"/>
+          </p:nvPr>
+        </p:nvSpPr>
+        <p:spPr>
+          <a:xfrm>
+            <a:off x="810000" y="447188"/>
+            <a:ext cx="10571998" cy="970450"/>
+          </a:xfrm>
+        </p:spPr>
         <p:txBody>
           <a:bodyPr/>
           <a:lstStyle/>
           <a:p>
-            <a:endParaRPr lang="es-CL" dirty="0"/>
+            <a:r>
+              <a:rPr lang="es-CL" dirty="0"/>
+              <a:t>USO EN CHILE</a:t>
+            </a:r>
+          </a:p>
+        </p:txBody>
+      </p:sp>
+      <p:pic>
+        <p:nvPicPr>
+          <p:cNvPr id="6" name="Picture 5">
+            <a:extLst>
+              <a:ext uri="{FF2B5EF4-FFF2-40B4-BE49-F238E27FC236}">
+                <a16:creationId xmlns:a16="http://schemas.microsoft.com/office/drawing/2014/main" id="{60579362-F617-49C7-87BB-467B050FABBF}"/>
+              </a:ext>
+            </a:extLst>
+          </p:cNvPr>
+          <p:cNvPicPr>
+            <a:picLocks noChangeAspect="1"/>
+          </p:cNvPicPr>
+          <p:nvPr/>
+        </p:nvPicPr>
+        <p:blipFill>
+          <a:blip r:embed="rId2">
+            <a:extLst>
+              <a:ext uri="{28A0092B-C50C-407E-A947-70E740481C1C}">
+                <a14:useLocalDpi xmlns:a14="http://schemas.microsoft.com/office/drawing/2010/main" val="0"/>
+              </a:ext>
+            </a:extLst>
+          </a:blip>
+          <a:stretch>
+            <a:fillRect/>
+          </a:stretch>
+        </p:blipFill>
+        <p:spPr>
+          <a:xfrm>
+            <a:off x="-18351" y="2962275"/>
+            <a:ext cx="6506737" cy="2916011"/>
+          </a:xfrm>
+          <a:prstGeom prst="rect">
+            <a:avLst/>
+          </a:prstGeom>
+        </p:spPr>
+      </p:pic>
+      <p:pic>
+        <p:nvPicPr>
+          <p:cNvPr id="8" name="Picture 7">
+            <a:extLst>
+              <a:ext uri="{FF2B5EF4-FFF2-40B4-BE49-F238E27FC236}">
+                <a16:creationId xmlns:a16="http://schemas.microsoft.com/office/drawing/2014/main" id="{4EB77AA2-AB56-446A-9C7B-A89551AAA0C3}"/>
+              </a:ext>
+            </a:extLst>
+          </p:cNvPr>
+          <p:cNvPicPr>
+            <a:picLocks noChangeAspect="1"/>
+          </p:cNvPicPr>
+          <p:nvPr/>
+        </p:nvPicPr>
+        <p:blipFill>
+          <a:blip r:embed="rId3">
+            <a:extLst>
+              <a:ext uri="{28A0092B-C50C-407E-A947-70E740481C1C}">
+                <a14:useLocalDpi xmlns:a14="http://schemas.microsoft.com/office/drawing/2010/main" val="0"/>
+              </a:ext>
+            </a:extLst>
+          </a:blip>
+          <a:stretch>
+            <a:fillRect/>
+          </a:stretch>
+        </p:blipFill>
+        <p:spPr>
+          <a:xfrm>
+            <a:off x="6659125" y="2699659"/>
+            <a:ext cx="5063138" cy="3711153"/>
+          </a:xfrm>
+          <a:prstGeom prst="rect">
+            <a:avLst/>
+          </a:prstGeom>
+        </p:spPr>
+      </p:pic>
+      <p:sp>
+        <p:nvSpPr>
+          <p:cNvPr id="9" name="TextBox 8">
+            <a:extLst>
+              <a:ext uri="{FF2B5EF4-FFF2-40B4-BE49-F238E27FC236}">
+                <a16:creationId xmlns:a16="http://schemas.microsoft.com/office/drawing/2014/main" id="{8EB5BA46-B80C-4BD2-ABC1-F2D1736C5B3D}"/>
+              </a:ext>
+            </a:extLst>
+          </p:cNvPr>
+          <p:cNvSpPr txBox="1"/>
+          <p:nvPr/>
+        </p:nvSpPr>
+        <p:spPr>
+          <a:xfrm>
+            <a:off x="896075" y="5878286"/>
+            <a:ext cx="4677884" cy="307777"/>
+          </a:xfrm>
+          <a:prstGeom prst="rect">
+            <a:avLst/>
+          </a:prstGeom>
+          <a:noFill/>
+        </p:spPr>
+        <p:txBody>
+          <a:bodyPr wrap="none" rtlCol="0">
+            <a:spAutoFit/>
+          </a:bodyPr>
+          <a:lstStyle/>
+          <a:p>
+            <a:r>
+              <a:rPr lang="es-CL" sz="1400" dirty="0">
+                <a:solidFill>
+                  <a:schemeClr val="tx2">
+                    <a:lumMod val="50000"/>
+                  </a:schemeClr>
+                </a:solidFill>
+              </a:rPr>
+              <a:t>Distribución de viviendas por material (Censo 2002).</a:t>
+            </a:r>
+            <a:endParaRPr lang="es-MX" sz="1400" dirty="0">
+              <a:solidFill>
+                <a:schemeClr val="tx2">
+                  <a:lumMod val="50000"/>
+                </a:schemeClr>
+              </a:solidFill>
+            </a:endParaRPr>
+          </a:p>
+        </p:txBody>
+      </p:sp>
+      <p:sp>
+        <p:nvSpPr>
+          <p:cNvPr id="10" name="TextBox 9">
+            <a:extLst>
+              <a:ext uri="{FF2B5EF4-FFF2-40B4-BE49-F238E27FC236}">
+                <a16:creationId xmlns:a16="http://schemas.microsoft.com/office/drawing/2014/main" id="{3D87D2CF-0C5B-4FD3-B0B1-9C7F1A7F519E}"/>
+              </a:ext>
+            </a:extLst>
+          </p:cNvPr>
+          <p:cNvSpPr txBox="1"/>
+          <p:nvPr/>
+        </p:nvSpPr>
+        <p:spPr>
+          <a:xfrm>
+            <a:off x="6659125" y="6334780"/>
+            <a:ext cx="5428342" cy="523220"/>
+          </a:xfrm>
+          <a:prstGeom prst="rect">
+            <a:avLst/>
+          </a:prstGeom>
+          <a:noFill/>
+        </p:spPr>
+        <p:txBody>
+          <a:bodyPr wrap="square" rtlCol="0">
+            <a:spAutoFit/>
+          </a:bodyPr>
+          <a:lstStyle/>
+          <a:p>
+            <a:r>
+              <a:rPr lang="es-CL" sz="1400" dirty="0">
+                <a:solidFill>
+                  <a:schemeClr val="tx2">
+                    <a:lumMod val="50000"/>
+                  </a:schemeClr>
+                </a:solidFill>
+              </a:rPr>
+              <a:t>Uso de albañilería, hormigón y madera en los últimos años (INE, 2002-2017).</a:t>
+            </a:r>
           </a:p>
         </p:txBody>
       </p:sp>
     </p:spTree>
     <p:extLst>
       <p:ext uri="{BB962C8B-B14F-4D97-AF65-F5344CB8AC3E}">
-        <p14:creationId xmlns:p14="http://schemas.microsoft.com/office/powerpoint/2010/main" val="1223577235"/>
+        <p14:creationId xmlns:p14="http://schemas.microsoft.com/office/powerpoint/2010/main" val="3139984690"/>
       </p:ext>
     </p:extLst>
   </p:cSld>
@@ -6797,10 +8184,10 @@
       </p:grpSpPr>
       <p:sp>
         <p:nvSpPr>
-          <p:cNvPr id="2" name="Título 1">
+          <p:cNvPr id="2" name="Title 1">
             <a:extLst>
               <a:ext uri="{FF2B5EF4-FFF2-40B4-BE49-F238E27FC236}">
-                <a16:creationId xmlns:a16="http://schemas.microsoft.com/office/drawing/2014/main" id="{7963A088-C063-40F0-8AD2-8AAC6199450A}"/>
+                <a16:creationId xmlns:a16="http://schemas.microsoft.com/office/drawing/2014/main" id="{33CD1ED3-B436-4AF9-A58B-8F817126E0C3}"/>
               </a:ext>
             </a:extLst>
           </p:cNvPr>
@@ -6820,15 +8207,16 @@
               <a:rPr lang="es-CL" dirty="0"/>
               <a:t>USO EN CHILE</a:t>
             </a:r>
-          </a:p>
-        </p:txBody>
-      </p:sp>
-      <p:sp>
-        <p:nvSpPr>
-          <p:cNvPr id="3" name="Marcador de contenido 2">
+            <a:endParaRPr lang="es-MX" dirty="0"/>
+          </a:p>
+        </p:txBody>
+      </p:sp>
+      <p:sp>
+        <p:nvSpPr>
+          <p:cNvPr id="3" name="Content Placeholder 2">
             <a:extLst>
               <a:ext uri="{FF2B5EF4-FFF2-40B4-BE49-F238E27FC236}">
-                <a16:creationId xmlns:a16="http://schemas.microsoft.com/office/drawing/2014/main" id="{22ABBA1F-64A6-4E9A-90FE-8AC824113733}"/>
+                <a16:creationId xmlns:a16="http://schemas.microsoft.com/office/drawing/2014/main" id="{5AD08B42-2041-4CA5-B78E-1968F64697C1}"/>
               </a:ext>
             </a:extLst>
           </p:cNvPr>
@@ -6839,19 +8227,641 @@
             <p:ph idx="1"/>
           </p:nvPr>
         </p:nvSpPr>
-        <p:spPr/>
+        <p:spPr>
+          <a:xfrm>
+            <a:off x="818712" y="2222287"/>
+            <a:ext cx="3782317" cy="3636511"/>
+          </a:xfrm>
+        </p:spPr>
         <p:txBody>
           <a:bodyPr/>
           <a:lstStyle/>
           <a:p>
-            <a:endParaRPr lang="es-CL"/>
+            <a:r>
+              <a:rPr lang="es-MX" dirty="0"/>
+              <a:t>Limitaciones de la OGUC</a:t>
+            </a:r>
+          </a:p>
+          <a:p>
+            <a:endParaRPr lang="es-MX" dirty="0"/>
+          </a:p>
+          <a:p>
+            <a:pPr>
+              <a:buFont typeface="Arial" panose="020B0604020202020204" pitchFamily="34" charset="0"/>
+              <a:buChar char="•"/>
+            </a:pPr>
+            <a:r>
+              <a:rPr lang="es-MX" dirty="0"/>
+              <a:t>Edificio clase C </a:t>
+            </a:r>
+          </a:p>
+          <a:p>
+            <a:pPr marL="2171400" lvl="5" indent="0">
+              <a:buNone/>
+            </a:pPr>
+            <a:endParaRPr lang="es-MX" sz="1600" dirty="0"/>
+          </a:p>
+          <a:p>
+            <a:pPr>
+              <a:buFont typeface="Arial" panose="020B0604020202020204" pitchFamily="34" charset="0"/>
+              <a:buChar char="•"/>
+            </a:pPr>
+            <a:endParaRPr lang="es-MX" dirty="0"/>
+          </a:p>
+          <a:p>
+            <a:pPr>
+              <a:buFont typeface="Arial" panose="020B0604020202020204" pitchFamily="34" charset="0"/>
+              <a:buChar char="•"/>
+            </a:pPr>
+            <a:r>
+              <a:rPr lang="es-MX" dirty="0"/>
+              <a:t>Edificio clase D</a:t>
+            </a:r>
+          </a:p>
+        </p:txBody>
+      </p:sp>
+      <p:sp>
+        <p:nvSpPr>
+          <p:cNvPr id="5" name="Content Placeholder 2">
+            <a:extLst>
+              <a:ext uri="{FF2B5EF4-FFF2-40B4-BE49-F238E27FC236}">
+                <a16:creationId xmlns:a16="http://schemas.microsoft.com/office/drawing/2014/main" id="{1BC1C24D-E871-4072-9746-BE648AA761F5}"/>
+              </a:ext>
+            </a:extLst>
+          </p:cNvPr>
+          <p:cNvSpPr txBox="1">
+            <a:spLocks/>
+          </p:cNvSpPr>
+          <p:nvPr/>
+        </p:nvSpPr>
+        <p:spPr>
+          <a:xfrm>
+            <a:off x="3200400" y="4670676"/>
+            <a:ext cx="1897070" cy="763600"/>
+          </a:xfrm>
+          <a:prstGeom prst="rect">
+            <a:avLst/>
+          </a:prstGeom>
+          <a:effectLst>
+            <a:outerShdw blurRad="50800" dir="14400000">
+              <a:srgbClr val="000000">
+                <a:alpha val="40000"/>
+              </a:srgbClr>
+            </a:outerShdw>
+          </a:effectLst>
+        </p:spPr>
+        <p:txBody>
+          <a:bodyPr vert="horz" lIns="91440" tIns="45720" rIns="91440" bIns="45720" rtlCol="0" anchor="ctr">
+            <a:normAutofit fontScale="92500"/>
+          </a:bodyPr>
+          <a:lstStyle>
+            <a:lvl1pPr marL="342900" indent="-342900" algn="l" defTabSz="457200" rtl="0" eaLnBrk="1" latinLnBrk="0" hangingPunct="1">
+              <a:spcBef>
+                <a:spcPct val="20000"/>
+              </a:spcBef>
+              <a:spcAft>
+                <a:spcPts val="600"/>
+              </a:spcAft>
+              <a:buClr>
+                <a:schemeClr val="accent1"/>
+              </a:buClr>
+              <a:buFont typeface="Wingdings 2" charset="2"/>
+              <a:buChar char=""/>
+              <a:defRPr sz="1800" kern="1200">
+                <a:solidFill>
+                  <a:schemeClr val="tx1"/>
+                </a:solidFill>
+                <a:latin typeface="+mn-lt"/>
+                <a:ea typeface="+mn-ea"/>
+                <a:cs typeface="+mn-cs"/>
+              </a:defRPr>
+            </a:lvl1pPr>
+            <a:lvl2pPr marL="742950" indent="-285750" algn="l" defTabSz="457200" rtl="0" eaLnBrk="1" latinLnBrk="0" hangingPunct="1">
+              <a:spcBef>
+                <a:spcPct val="20000"/>
+              </a:spcBef>
+              <a:spcAft>
+                <a:spcPts val="600"/>
+              </a:spcAft>
+              <a:buClr>
+                <a:schemeClr val="accent1"/>
+              </a:buClr>
+              <a:buFont typeface="Wingdings 2" charset="2"/>
+              <a:buChar char=""/>
+              <a:defRPr sz="1600" kern="1200">
+                <a:solidFill>
+                  <a:schemeClr val="tx1"/>
+                </a:solidFill>
+                <a:latin typeface="+mn-lt"/>
+                <a:ea typeface="+mn-ea"/>
+                <a:cs typeface="+mn-cs"/>
+              </a:defRPr>
+            </a:lvl2pPr>
+            <a:lvl3pPr marL="1143000" indent="-228600" algn="l" defTabSz="457200" rtl="0" eaLnBrk="1" latinLnBrk="0" hangingPunct="1">
+              <a:spcBef>
+                <a:spcPct val="20000"/>
+              </a:spcBef>
+              <a:spcAft>
+                <a:spcPts val="600"/>
+              </a:spcAft>
+              <a:buClr>
+                <a:schemeClr val="accent1"/>
+              </a:buClr>
+              <a:buFont typeface="Wingdings 2" charset="2"/>
+              <a:buChar char=""/>
+              <a:defRPr sz="1400" kern="1200">
+                <a:solidFill>
+                  <a:schemeClr val="tx1"/>
+                </a:solidFill>
+                <a:latin typeface="+mn-lt"/>
+                <a:ea typeface="+mn-ea"/>
+                <a:cs typeface="+mn-cs"/>
+              </a:defRPr>
+            </a:lvl3pPr>
+            <a:lvl4pPr marL="1600200" indent="-228600" algn="l" defTabSz="457200" rtl="0" eaLnBrk="1" latinLnBrk="0" hangingPunct="1">
+              <a:spcBef>
+                <a:spcPct val="20000"/>
+              </a:spcBef>
+              <a:spcAft>
+                <a:spcPts val="600"/>
+              </a:spcAft>
+              <a:buClr>
+                <a:schemeClr val="accent1"/>
+              </a:buClr>
+              <a:buFont typeface="Wingdings 2" charset="2"/>
+              <a:buChar char=""/>
+              <a:defRPr sz="1200" kern="1200">
+                <a:solidFill>
+                  <a:schemeClr val="tx1"/>
+                </a:solidFill>
+                <a:latin typeface="+mn-lt"/>
+                <a:ea typeface="+mn-ea"/>
+                <a:cs typeface="+mn-cs"/>
+              </a:defRPr>
+            </a:lvl4pPr>
+            <a:lvl5pPr marL="2057400" indent="-228600" algn="l" defTabSz="457200" rtl="0" eaLnBrk="1" latinLnBrk="0" hangingPunct="1">
+              <a:spcBef>
+                <a:spcPct val="20000"/>
+              </a:spcBef>
+              <a:spcAft>
+                <a:spcPts val="600"/>
+              </a:spcAft>
+              <a:buClr>
+                <a:schemeClr val="accent1"/>
+              </a:buClr>
+              <a:buFont typeface="Wingdings 2" charset="2"/>
+              <a:buChar char=""/>
+              <a:defRPr sz="1200" kern="1200">
+                <a:solidFill>
+                  <a:schemeClr val="tx1"/>
+                </a:solidFill>
+                <a:latin typeface="+mn-lt"/>
+                <a:ea typeface="+mn-ea"/>
+                <a:cs typeface="+mn-cs"/>
+              </a:defRPr>
+            </a:lvl5pPr>
+            <a:lvl6pPr marL="2400000" indent="-228600" algn="l" defTabSz="457200" rtl="0" eaLnBrk="1" latinLnBrk="0" hangingPunct="1">
+              <a:spcBef>
+                <a:spcPct val="20000"/>
+              </a:spcBef>
+              <a:spcAft>
+                <a:spcPts val="600"/>
+              </a:spcAft>
+              <a:buClr>
+                <a:schemeClr val="accent1"/>
+              </a:buClr>
+              <a:buFont typeface="Wingdings 2" charset="2"/>
+              <a:buChar char=""/>
+              <a:defRPr sz="1200" kern="1200">
+                <a:solidFill>
+                  <a:schemeClr val="tx1"/>
+                </a:solidFill>
+                <a:latin typeface="+mn-lt"/>
+                <a:ea typeface="+mn-ea"/>
+                <a:cs typeface="+mn-cs"/>
+              </a:defRPr>
+            </a:lvl6pPr>
+            <a:lvl7pPr marL="2800000" indent="-228600" algn="l" defTabSz="457200" rtl="0" eaLnBrk="1" latinLnBrk="0" hangingPunct="1">
+              <a:spcBef>
+                <a:spcPct val="20000"/>
+              </a:spcBef>
+              <a:spcAft>
+                <a:spcPts val="600"/>
+              </a:spcAft>
+              <a:buClr>
+                <a:schemeClr val="accent1"/>
+              </a:buClr>
+              <a:buFont typeface="Wingdings 2" charset="2"/>
+              <a:buChar char=""/>
+              <a:defRPr sz="1200" kern="1200">
+                <a:solidFill>
+                  <a:schemeClr val="tx1"/>
+                </a:solidFill>
+                <a:latin typeface="+mn-lt"/>
+                <a:ea typeface="+mn-ea"/>
+                <a:cs typeface="+mn-cs"/>
+              </a:defRPr>
+            </a:lvl7pPr>
+            <a:lvl8pPr marL="3200000" indent="-228600" algn="l" defTabSz="457200" rtl="0" eaLnBrk="1" latinLnBrk="0" hangingPunct="1">
+              <a:spcBef>
+                <a:spcPct val="20000"/>
+              </a:spcBef>
+              <a:spcAft>
+                <a:spcPts val="600"/>
+              </a:spcAft>
+              <a:buClr>
+                <a:schemeClr val="accent1"/>
+              </a:buClr>
+              <a:buFont typeface="Wingdings 2" charset="2"/>
+              <a:buChar char=""/>
+              <a:defRPr sz="1200" kern="1200">
+                <a:solidFill>
+                  <a:schemeClr val="tx1"/>
+                </a:solidFill>
+                <a:latin typeface="+mn-lt"/>
+                <a:ea typeface="+mn-ea"/>
+                <a:cs typeface="+mn-cs"/>
+              </a:defRPr>
+            </a:lvl8pPr>
+            <a:lvl9pPr marL="3600000" indent="-228600" algn="l" defTabSz="457200" rtl="0" eaLnBrk="1" latinLnBrk="0" hangingPunct="1">
+              <a:spcBef>
+                <a:spcPct val="20000"/>
+              </a:spcBef>
+              <a:spcAft>
+                <a:spcPts val="600"/>
+              </a:spcAft>
+              <a:buClr>
+                <a:schemeClr val="accent1"/>
+              </a:buClr>
+              <a:buFont typeface="Wingdings 2" charset="2"/>
+              <a:buChar char=""/>
+              <a:defRPr sz="1200" kern="1200">
+                <a:solidFill>
+                  <a:schemeClr val="tx1"/>
+                </a:solidFill>
+                <a:latin typeface="+mn-lt"/>
+                <a:ea typeface="+mn-ea"/>
+                <a:cs typeface="+mn-cs"/>
+              </a:defRPr>
+            </a:lvl9pPr>
+          </a:lstStyle>
+          <a:p>
+            <a:pPr marL="87313" lvl="5" algn="just">
+              <a:buNone/>
+            </a:pPr>
+            <a:r>
+              <a:rPr lang="es-MX" sz="1600" dirty="0"/>
+              <a:t>2 pisos</a:t>
+            </a:r>
+          </a:p>
+          <a:p>
+            <a:pPr marL="87313" lvl="5" algn="just">
+              <a:buNone/>
+            </a:pPr>
+            <a:r>
+              <a:rPr lang="es-MX" sz="1600" dirty="0"/>
+              <a:t>Altura libre &lt; 2.6 m</a:t>
+            </a:r>
+          </a:p>
+        </p:txBody>
+      </p:sp>
+      <p:sp>
+        <p:nvSpPr>
+          <p:cNvPr id="6" name="Content Placeholder 2">
+            <a:extLst>
+              <a:ext uri="{FF2B5EF4-FFF2-40B4-BE49-F238E27FC236}">
+                <a16:creationId xmlns:a16="http://schemas.microsoft.com/office/drawing/2014/main" id="{E5C48B42-96F5-42F1-BD09-ABF58575A966}"/>
+              </a:ext>
+            </a:extLst>
+          </p:cNvPr>
+          <p:cNvSpPr txBox="1">
+            <a:spLocks/>
+          </p:cNvSpPr>
+          <p:nvPr/>
+        </p:nvSpPr>
+        <p:spPr>
+          <a:xfrm>
+            <a:off x="3200400" y="3484228"/>
+            <a:ext cx="1897070" cy="763600"/>
+          </a:xfrm>
+          <a:prstGeom prst="rect">
+            <a:avLst/>
+          </a:prstGeom>
+          <a:effectLst>
+            <a:outerShdw blurRad="50800" dir="14400000">
+              <a:srgbClr val="000000">
+                <a:alpha val="40000"/>
+              </a:srgbClr>
+            </a:outerShdw>
+          </a:effectLst>
+        </p:spPr>
+        <p:txBody>
+          <a:bodyPr vert="horz" lIns="91440" tIns="45720" rIns="91440" bIns="45720" rtlCol="0" anchor="ctr">
+            <a:normAutofit/>
+          </a:bodyPr>
+          <a:lstStyle>
+            <a:lvl1pPr marL="342900" indent="-342900" algn="l" defTabSz="457200" rtl="0" eaLnBrk="1" latinLnBrk="0" hangingPunct="1">
+              <a:spcBef>
+                <a:spcPct val="20000"/>
+              </a:spcBef>
+              <a:spcAft>
+                <a:spcPts val="600"/>
+              </a:spcAft>
+              <a:buClr>
+                <a:schemeClr val="accent1"/>
+              </a:buClr>
+              <a:buFont typeface="Wingdings 2" charset="2"/>
+              <a:buChar char=""/>
+              <a:defRPr sz="1800" kern="1200">
+                <a:solidFill>
+                  <a:schemeClr val="tx1"/>
+                </a:solidFill>
+                <a:latin typeface="+mn-lt"/>
+                <a:ea typeface="+mn-ea"/>
+                <a:cs typeface="+mn-cs"/>
+              </a:defRPr>
+            </a:lvl1pPr>
+            <a:lvl2pPr marL="742950" indent="-285750" algn="l" defTabSz="457200" rtl="0" eaLnBrk="1" latinLnBrk="0" hangingPunct="1">
+              <a:spcBef>
+                <a:spcPct val="20000"/>
+              </a:spcBef>
+              <a:spcAft>
+                <a:spcPts val="600"/>
+              </a:spcAft>
+              <a:buClr>
+                <a:schemeClr val="accent1"/>
+              </a:buClr>
+              <a:buFont typeface="Wingdings 2" charset="2"/>
+              <a:buChar char=""/>
+              <a:defRPr sz="1600" kern="1200">
+                <a:solidFill>
+                  <a:schemeClr val="tx1"/>
+                </a:solidFill>
+                <a:latin typeface="+mn-lt"/>
+                <a:ea typeface="+mn-ea"/>
+                <a:cs typeface="+mn-cs"/>
+              </a:defRPr>
+            </a:lvl2pPr>
+            <a:lvl3pPr marL="1143000" indent="-228600" algn="l" defTabSz="457200" rtl="0" eaLnBrk="1" latinLnBrk="0" hangingPunct="1">
+              <a:spcBef>
+                <a:spcPct val="20000"/>
+              </a:spcBef>
+              <a:spcAft>
+                <a:spcPts val="600"/>
+              </a:spcAft>
+              <a:buClr>
+                <a:schemeClr val="accent1"/>
+              </a:buClr>
+              <a:buFont typeface="Wingdings 2" charset="2"/>
+              <a:buChar char=""/>
+              <a:defRPr sz="1400" kern="1200">
+                <a:solidFill>
+                  <a:schemeClr val="tx1"/>
+                </a:solidFill>
+                <a:latin typeface="+mn-lt"/>
+                <a:ea typeface="+mn-ea"/>
+                <a:cs typeface="+mn-cs"/>
+              </a:defRPr>
+            </a:lvl3pPr>
+            <a:lvl4pPr marL="1600200" indent="-228600" algn="l" defTabSz="457200" rtl="0" eaLnBrk="1" latinLnBrk="0" hangingPunct="1">
+              <a:spcBef>
+                <a:spcPct val="20000"/>
+              </a:spcBef>
+              <a:spcAft>
+                <a:spcPts val="600"/>
+              </a:spcAft>
+              <a:buClr>
+                <a:schemeClr val="accent1"/>
+              </a:buClr>
+              <a:buFont typeface="Wingdings 2" charset="2"/>
+              <a:buChar char=""/>
+              <a:defRPr sz="1200" kern="1200">
+                <a:solidFill>
+                  <a:schemeClr val="tx1"/>
+                </a:solidFill>
+                <a:latin typeface="+mn-lt"/>
+                <a:ea typeface="+mn-ea"/>
+                <a:cs typeface="+mn-cs"/>
+              </a:defRPr>
+            </a:lvl4pPr>
+            <a:lvl5pPr marL="2057400" indent="-228600" algn="l" defTabSz="457200" rtl="0" eaLnBrk="1" latinLnBrk="0" hangingPunct="1">
+              <a:spcBef>
+                <a:spcPct val="20000"/>
+              </a:spcBef>
+              <a:spcAft>
+                <a:spcPts val="600"/>
+              </a:spcAft>
+              <a:buClr>
+                <a:schemeClr val="accent1"/>
+              </a:buClr>
+              <a:buFont typeface="Wingdings 2" charset="2"/>
+              <a:buChar char=""/>
+              <a:defRPr sz="1200" kern="1200">
+                <a:solidFill>
+                  <a:schemeClr val="tx1"/>
+                </a:solidFill>
+                <a:latin typeface="+mn-lt"/>
+                <a:ea typeface="+mn-ea"/>
+                <a:cs typeface="+mn-cs"/>
+              </a:defRPr>
+            </a:lvl5pPr>
+            <a:lvl6pPr marL="2400000" indent="-228600" algn="l" defTabSz="457200" rtl="0" eaLnBrk="1" latinLnBrk="0" hangingPunct="1">
+              <a:spcBef>
+                <a:spcPct val="20000"/>
+              </a:spcBef>
+              <a:spcAft>
+                <a:spcPts val="600"/>
+              </a:spcAft>
+              <a:buClr>
+                <a:schemeClr val="accent1"/>
+              </a:buClr>
+              <a:buFont typeface="Wingdings 2" charset="2"/>
+              <a:buChar char=""/>
+              <a:defRPr sz="1200" kern="1200">
+                <a:solidFill>
+                  <a:schemeClr val="tx1"/>
+                </a:solidFill>
+                <a:latin typeface="+mn-lt"/>
+                <a:ea typeface="+mn-ea"/>
+                <a:cs typeface="+mn-cs"/>
+              </a:defRPr>
+            </a:lvl6pPr>
+            <a:lvl7pPr marL="2800000" indent="-228600" algn="l" defTabSz="457200" rtl="0" eaLnBrk="1" latinLnBrk="0" hangingPunct="1">
+              <a:spcBef>
+                <a:spcPct val="20000"/>
+              </a:spcBef>
+              <a:spcAft>
+                <a:spcPts val="600"/>
+              </a:spcAft>
+              <a:buClr>
+                <a:schemeClr val="accent1"/>
+              </a:buClr>
+              <a:buFont typeface="Wingdings 2" charset="2"/>
+              <a:buChar char=""/>
+              <a:defRPr sz="1200" kern="1200">
+                <a:solidFill>
+                  <a:schemeClr val="tx1"/>
+                </a:solidFill>
+                <a:latin typeface="+mn-lt"/>
+                <a:ea typeface="+mn-ea"/>
+                <a:cs typeface="+mn-cs"/>
+              </a:defRPr>
+            </a:lvl7pPr>
+            <a:lvl8pPr marL="3200000" indent="-228600" algn="l" defTabSz="457200" rtl="0" eaLnBrk="1" latinLnBrk="0" hangingPunct="1">
+              <a:spcBef>
+                <a:spcPct val="20000"/>
+              </a:spcBef>
+              <a:spcAft>
+                <a:spcPts val="600"/>
+              </a:spcAft>
+              <a:buClr>
+                <a:schemeClr val="accent1"/>
+              </a:buClr>
+              <a:buFont typeface="Wingdings 2" charset="2"/>
+              <a:buChar char=""/>
+              <a:defRPr sz="1200" kern="1200">
+                <a:solidFill>
+                  <a:schemeClr val="tx1"/>
+                </a:solidFill>
+                <a:latin typeface="+mn-lt"/>
+                <a:ea typeface="+mn-ea"/>
+                <a:cs typeface="+mn-cs"/>
+              </a:defRPr>
+            </a:lvl8pPr>
+            <a:lvl9pPr marL="3600000" indent="-228600" algn="l" defTabSz="457200" rtl="0" eaLnBrk="1" latinLnBrk="0" hangingPunct="1">
+              <a:spcBef>
+                <a:spcPct val="20000"/>
+              </a:spcBef>
+              <a:spcAft>
+                <a:spcPts val="600"/>
+              </a:spcAft>
+              <a:buClr>
+                <a:schemeClr val="accent1"/>
+              </a:buClr>
+              <a:buFont typeface="Wingdings 2" charset="2"/>
+              <a:buChar char=""/>
+              <a:defRPr sz="1200" kern="1200">
+                <a:solidFill>
+                  <a:schemeClr val="tx1"/>
+                </a:solidFill>
+                <a:latin typeface="+mn-lt"/>
+                <a:ea typeface="+mn-ea"/>
+                <a:cs typeface="+mn-cs"/>
+              </a:defRPr>
+            </a:lvl9pPr>
+          </a:lstStyle>
+          <a:p>
+            <a:pPr marL="87313" lvl="5" algn="just">
+              <a:buNone/>
+            </a:pPr>
+            <a:r>
+              <a:rPr lang="es-MX" sz="1600" dirty="0"/>
+              <a:t>4 pisos</a:t>
+            </a:r>
+          </a:p>
+          <a:p>
+            <a:pPr marL="87313" lvl="5" algn="just">
+              <a:buNone/>
+            </a:pPr>
+            <a:r>
+              <a:rPr lang="es-MX" sz="1600" dirty="0"/>
+              <a:t>Altura libre &lt; 5m</a:t>
+            </a:r>
+          </a:p>
+        </p:txBody>
+      </p:sp>
+      <p:sp>
+        <p:nvSpPr>
+          <p:cNvPr id="7" name="Left Brace 6">
+            <a:extLst>
+              <a:ext uri="{FF2B5EF4-FFF2-40B4-BE49-F238E27FC236}">
+                <a16:creationId xmlns:a16="http://schemas.microsoft.com/office/drawing/2014/main" id="{D44C588E-C60B-416B-9333-3A4CC639E1EB}"/>
+              </a:ext>
+            </a:extLst>
+          </p:cNvPr>
+          <p:cNvSpPr/>
+          <p:nvPr/>
+        </p:nvSpPr>
+        <p:spPr>
+          <a:xfrm>
+            <a:off x="3106057" y="3539457"/>
+            <a:ext cx="188686" cy="653143"/>
+          </a:xfrm>
+          <a:prstGeom prst="leftBrace">
+            <a:avLst/>
+          </a:prstGeom>
+        </p:spPr>
+        <p:style>
+          <a:lnRef idx="1">
+            <a:schemeClr val="accent1"/>
+          </a:lnRef>
+          <a:fillRef idx="0">
+            <a:schemeClr val="accent1"/>
+          </a:fillRef>
+          <a:effectRef idx="0">
+            <a:schemeClr val="accent1"/>
+          </a:effectRef>
+          <a:fontRef idx="minor">
+            <a:schemeClr val="tx1"/>
+          </a:fontRef>
+        </p:style>
+        <p:txBody>
+          <a:bodyPr rtlCol="0" anchor="ctr"/>
+          <a:lstStyle/>
+          <a:p>
+            <a:pPr algn="ctr"/>
+            <a:endParaRPr lang="es-MX"/>
+          </a:p>
+        </p:txBody>
+      </p:sp>
+      <p:sp>
+        <p:nvSpPr>
+          <p:cNvPr id="8" name="Left Brace 7">
+            <a:extLst>
+              <a:ext uri="{FF2B5EF4-FFF2-40B4-BE49-F238E27FC236}">
+                <a16:creationId xmlns:a16="http://schemas.microsoft.com/office/drawing/2014/main" id="{225DC22B-FCE0-497B-9F36-3D7F926FB470}"/>
+              </a:ext>
+            </a:extLst>
+          </p:cNvPr>
+          <p:cNvSpPr/>
+          <p:nvPr/>
+        </p:nvSpPr>
+        <p:spPr>
+          <a:xfrm>
+            <a:off x="3106057" y="4725905"/>
+            <a:ext cx="188686" cy="653143"/>
+          </a:xfrm>
+          <a:prstGeom prst="leftBrace">
+            <a:avLst/>
+          </a:prstGeom>
+        </p:spPr>
+        <p:style>
+          <a:lnRef idx="1">
+            <a:schemeClr val="accent1"/>
+          </a:lnRef>
+          <a:fillRef idx="0">
+            <a:schemeClr val="accent1"/>
+          </a:fillRef>
+          <a:effectRef idx="0">
+            <a:schemeClr val="accent1"/>
+          </a:effectRef>
+          <a:fontRef idx="minor">
+            <a:schemeClr val="tx1"/>
+          </a:fontRef>
+        </p:style>
+        <p:txBody>
+          <a:bodyPr rtlCol="0" anchor="ctr"/>
+          <a:lstStyle/>
+          <a:p>
+            <a:pPr algn="ctr"/>
+            <a:endParaRPr lang="es-MX"/>
           </a:p>
         </p:txBody>
       </p:sp>
     </p:spTree>
     <p:extLst>
       <p:ext uri="{BB962C8B-B14F-4D97-AF65-F5344CB8AC3E}">
-        <p14:creationId xmlns:p14="http://schemas.microsoft.com/office/powerpoint/2010/main" val="3365775483"/>
+        <p14:creationId xmlns:p14="http://schemas.microsoft.com/office/powerpoint/2010/main" val="1064455975"/>
       </p:ext>
     </p:extLst>
   </p:cSld>

</xml_diff>